<commit_message>
[+]UPDATE document and DELETE frontend
</commit_message>
<xml_diff>
--- a/document/와이어프레임/프레젠테이션1.pptx
+++ b/document/와이어프레임/프레젠테이션1.pptx
@@ -7,7 +7,12 @@
   <p:sldIdLst>
     <p:sldId id="256" r:id="rId2"/>
     <p:sldId id="257" r:id="rId3"/>
-    <p:sldId id="258" r:id="rId4"/>
+    <p:sldId id="261" r:id="rId4"/>
+    <p:sldId id="263" r:id="rId5"/>
+    <p:sldId id="259" r:id="rId6"/>
+    <p:sldId id="260" r:id="rId7"/>
+    <p:sldId id="262" r:id="rId8"/>
+    <p:sldId id="258" r:id="rId9"/>
   </p:sldIdLst>
   <p:sldSz cx="12192000" cy="6858000"/>
   <p:notesSz cx="6858000" cy="9144000"/>
@@ -107,6 +112,34 @@
     </a:lvl9pPr>
   </p:defaultTextStyle>
   <p:extLst>
+    <p:ext uri="{521415D9-36F7-43E2-AB2F-B90AF26B5E84}">
+      <p14:sectionLst xmlns:p14="http://schemas.microsoft.com/office/powerpoint/2010/main">
+        <p14:section name="메인" id="{B1B59C9E-743B-47B1-8B69-F5D7A65CCE77}">
+          <p14:sldIdLst>
+            <p14:sldId id="256"/>
+            <p14:sldId id="257"/>
+            <p14:sldId id="261"/>
+          </p14:sldIdLst>
+        </p14:section>
+        <p14:section name="로그인" id="{086DEDD9-F7B5-4264-A154-3745548D90BD}">
+          <p14:sldIdLst>
+            <p14:sldId id="263"/>
+          </p14:sldIdLst>
+        </p14:section>
+        <p14:section name="동아리목록" id="{4C97A60F-3217-4DDF-8CCF-7531F95E6296}">
+          <p14:sldIdLst>
+            <p14:sldId id="259"/>
+            <p14:sldId id="260"/>
+          </p14:sldIdLst>
+        </p14:section>
+        <p14:section name="동아리상세" id="{534F5C97-768E-49D8-8381-676E36385957}">
+          <p14:sldIdLst>
+            <p14:sldId id="262"/>
+            <p14:sldId id="258"/>
+          </p14:sldIdLst>
+        </p14:section>
+      </p14:sectionLst>
+    </p:ext>
     <p:ext uri="{EFAFB233-063F-42B5-8137-9DF3F51BA10A}">
       <p15:sldGuideLst xmlns:p15="http://schemas.microsoft.com/office/powerpoint/2012/main"/>
     </p:ext>
@@ -123,6 +156,13 @@
       </p:ext>
     </p:extLst>
   </p:cmAuthor>
+  <p:cmAuthor id="2" name="정 현희" initials="정현" lastIdx="5" clrIdx="1">
+    <p:extLst>
+      <p:ext uri="{19B8F6BF-5375-455C-9EA6-DF929625EA0E}">
+        <p15:presenceInfo xmlns:p15="http://schemas.microsoft.com/office/powerpoint/2012/main" userId="36513891958fb9b3" providerId="Windows Live"/>
+      </p:ext>
+    </p:extLst>
+  </p:cmAuthor>
 </p:cmAuthorLst>
 </file>
 
@@ -131,6 +171,53 @@
   <p:cm authorId="1" dt="2020-12-30T19:19:47.350" idx="1">
     <p:pos x="50" y="1074"/>
     <p:text>마우스 올렸을</p:text>
+    <p:extLst>
+      <p:ext uri="{C676402C-5697-4E1C-873F-D02D1690AC5C}">
+        <p15:threadingInfo xmlns:p15="http://schemas.microsoft.com/office/powerpoint/2012/main" timeZoneBias="-540"/>
+      </p:ext>
+    </p:extLst>
+  </p:cm>
+</p:cmLst>
+</file>
+
+<file path=ppt/comments/comment2.xml><?xml version="1.0" encoding="utf-8"?>
+<p:cmLst xmlns:a="http://schemas.openxmlformats.org/drawingml/2006/main" xmlns:r="http://schemas.openxmlformats.org/officeDocument/2006/relationships" xmlns:p="http://schemas.openxmlformats.org/presentationml/2006/main">
+  <p:cm authorId="2" dt="2021-01-04T20:43:11.470" idx="3">
+    <p:pos x="1559" y="1349"/>
+    <p:text>최신 5~10개 정도만</p:text>
+    <p:extLst>
+      <p:ext uri="{C676402C-5697-4E1C-873F-D02D1690AC5C}">
+        <p15:threadingInfo xmlns:p15="http://schemas.microsoft.com/office/powerpoint/2012/main" timeZoneBias="-540"/>
+      </p:ext>
+    </p:extLst>
+  </p:cm>
+  <p:cm authorId="2" dt="2021-01-04T20:43:46.257" idx="4">
+    <p:pos x="6665" y="1341"/>
+    <p:text>최신 10개 정도</p:text>
+    <p:extLst>
+      <p:ext uri="{C676402C-5697-4E1C-873F-D02D1690AC5C}">
+        <p15:threadingInfo xmlns:p15="http://schemas.microsoft.com/office/powerpoint/2012/main" timeZoneBias="-540"/>
+      </p:ext>
+    </p:extLst>
+  </p:cm>
+  <p:cm authorId="2" dt="2021-01-04T20:45:39.341" idx="5">
+    <p:pos x="4330" y="1341"/>
+    <p:text>월별 일정 조회
+()동아리 회장만 해당 동아리의 일정등록/수정/삭제 가능</p:text>
+    <p:extLst>
+      <p:ext uri="{C676402C-5697-4E1C-873F-D02D1690AC5C}">
+        <p15:threadingInfo xmlns:p15="http://schemas.microsoft.com/office/powerpoint/2012/main" timeZoneBias="-540"/>
+      </p:ext>
+    </p:extLst>
+  </p:cm>
+</p:cmLst>
+</file>
+
+<file path=ppt/comments/comment3.xml><?xml version="1.0" encoding="utf-8"?>
+<p:cmLst xmlns:a="http://schemas.openxmlformats.org/drawingml/2006/main" xmlns:r="http://schemas.openxmlformats.org/officeDocument/2006/relationships" xmlns:p="http://schemas.openxmlformats.org/presentationml/2006/main">
+  <p:cm authorId="2" dt="2021-01-04T19:59:58.230" idx="2">
+    <p:pos x="4938" y="3100"/>
+    <p:text>위아래 구분선 없음</p:text>
     <p:extLst>
       <p:ext uri="{C676402C-5697-4E1C-873F-D02D1690AC5C}">
         <p15:threadingInfo xmlns:p15="http://schemas.microsoft.com/office/powerpoint/2012/main" timeZoneBias="-540"/>
@@ -287,7 +374,7 @@
           <a:p>
             <a:fld id="{1F8A5F81-C9E2-4636-AA08-E62651847CC4}" type="datetimeFigureOut">
               <a:rPr lang="ko-KR" altLang="en-US" smtClean="0"/>
-              <a:t>2020-12-30</a:t>
+              <a:t>2021-01-04</a:t>
             </a:fld>
             <a:endParaRPr lang="ko-KR" altLang="en-US"/>
           </a:p>
@@ -485,7 +572,7 @@
           <a:p>
             <a:fld id="{1F8A5F81-C9E2-4636-AA08-E62651847CC4}" type="datetimeFigureOut">
               <a:rPr lang="ko-KR" altLang="en-US" smtClean="0"/>
-              <a:t>2020-12-30</a:t>
+              <a:t>2021-01-04</a:t>
             </a:fld>
             <a:endParaRPr lang="ko-KR" altLang="en-US"/>
           </a:p>
@@ -693,7 +780,7 @@
           <a:p>
             <a:fld id="{1F8A5F81-C9E2-4636-AA08-E62651847CC4}" type="datetimeFigureOut">
               <a:rPr lang="ko-KR" altLang="en-US" smtClean="0"/>
-              <a:t>2020-12-30</a:t>
+              <a:t>2021-01-04</a:t>
             </a:fld>
             <a:endParaRPr lang="ko-KR" altLang="en-US"/>
           </a:p>
@@ -891,7 +978,7 @@
           <a:p>
             <a:fld id="{1F8A5F81-C9E2-4636-AA08-E62651847CC4}" type="datetimeFigureOut">
               <a:rPr lang="ko-KR" altLang="en-US" smtClean="0"/>
-              <a:t>2020-12-30</a:t>
+              <a:t>2021-01-04</a:t>
             </a:fld>
             <a:endParaRPr lang="ko-KR" altLang="en-US"/>
           </a:p>
@@ -1166,7 +1253,7 @@
           <a:p>
             <a:fld id="{1F8A5F81-C9E2-4636-AA08-E62651847CC4}" type="datetimeFigureOut">
               <a:rPr lang="ko-KR" altLang="en-US" smtClean="0"/>
-              <a:t>2020-12-30</a:t>
+              <a:t>2021-01-04</a:t>
             </a:fld>
             <a:endParaRPr lang="ko-KR" altLang="en-US"/>
           </a:p>
@@ -1431,7 +1518,7 @@
           <a:p>
             <a:fld id="{1F8A5F81-C9E2-4636-AA08-E62651847CC4}" type="datetimeFigureOut">
               <a:rPr lang="ko-KR" altLang="en-US" smtClean="0"/>
-              <a:t>2020-12-30</a:t>
+              <a:t>2021-01-04</a:t>
             </a:fld>
             <a:endParaRPr lang="ko-KR" altLang="en-US"/>
           </a:p>
@@ -1843,7 +1930,7 @@
           <a:p>
             <a:fld id="{1F8A5F81-C9E2-4636-AA08-E62651847CC4}" type="datetimeFigureOut">
               <a:rPr lang="ko-KR" altLang="en-US" smtClean="0"/>
-              <a:t>2020-12-30</a:t>
+              <a:t>2021-01-04</a:t>
             </a:fld>
             <a:endParaRPr lang="ko-KR" altLang="en-US"/>
           </a:p>
@@ -1984,7 +2071,7 @@
           <a:p>
             <a:fld id="{1F8A5F81-C9E2-4636-AA08-E62651847CC4}" type="datetimeFigureOut">
               <a:rPr lang="ko-KR" altLang="en-US" smtClean="0"/>
-              <a:t>2020-12-30</a:t>
+              <a:t>2021-01-04</a:t>
             </a:fld>
             <a:endParaRPr lang="ko-KR" altLang="en-US"/>
           </a:p>
@@ -2097,7 +2184,7 @@
           <a:p>
             <a:fld id="{1F8A5F81-C9E2-4636-AA08-E62651847CC4}" type="datetimeFigureOut">
               <a:rPr lang="ko-KR" altLang="en-US" smtClean="0"/>
-              <a:t>2020-12-30</a:t>
+              <a:t>2021-01-04</a:t>
             </a:fld>
             <a:endParaRPr lang="ko-KR" altLang="en-US"/>
           </a:p>
@@ -2408,7 +2495,7 @@
           <a:p>
             <a:fld id="{1F8A5F81-C9E2-4636-AA08-E62651847CC4}" type="datetimeFigureOut">
               <a:rPr lang="ko-KR" altLang="en-US" smtClean="0"/>
-              <a:t>2020-12-30</a:t>
+              <a:t>2021-01-04</a:t>
             </a:fld>
             <a:endParaRPr lang="ko-KR" altLang="en-US"/>
           </a:p>
@@ -2696,7 +2783,7 @@
           <a:p>
             <a:fld id="{1F8A5F81-C9E2-4636-AA08-E62651847CC4}" type="datetimeFigureOut">
               <a:rPr lang="ko-KR" altLang="en-US" smtClean="0"/>
-              <a:t>2020-12-30</a:t>
+              <a:t>2021-01-04</a:t>
             </a:fld>
             <a:endParaRPr lang="ko-KR" altLang="en-US"/>
           </a:p>
@@ -2937,7 +3024,7 @@
           <a:p>
             <a:fld id="{1F8A5F81-C9E2-4636-AA08-E62651847CC4}" type="datetimeFigureOut">
               <a:rPr lang="ko-KR" altLang="en-US" smtClean="0"/>
-              <a:t>2020-12-30</a:t>
+              <a:t>2021-01-04</a:t>
             </a:fld>
             <a:endParaRPr lang="ko-KR" altLang="en-US"/>
           </a:p>
@@ -3496,6 +3583,9 @@
               <a:alpha val="39000"/>
             </a:schemeClr>
           </a:solidFill>
+          <a:ln>
+            <a:noFill/>
+          </a:ln>
         </p:spPr>
         <p:style>
           <a:lnRef idx="2">
@@ -3578,7 +3668,7 @@
         </p:nvSpPr>
         <p:spPr>
           <a:xfrm>
-            <a:off x="5934074" y="3774614"/>
+            <a:off x="5805972" y="3825993"/>
             <a:ext cx="3881438" cy="646331"/>
           </a:xfrm>
           <a:prstGeom prst="rect">
@@ -3620,7 +3710,7 @@
         </p:nvSpPr>
         <p:spPr>
           <a:xfrm>
-            <a:off x="11144250" y="6485234"/>
+            <a:off x="8639660" y="4576809"/>
             <a:ext cx="1047750" cy="292388"/>
           </a:xfrm>
           <a:prstGeom prst="rect">
@@ -3635,7 +3725,7 @@
           <a:lstStyle/>
           <a:p>
             <a:r>
-              <a:rPr lang="ko-KR" altLang="en-US" sz="1300" u="sng">
+              <a:rPr lang="ko-KR" altLang="en-US" sz="1300" u="sng" dirty="0" err="1">
                 <a:solidFill>
                   <a:schemeClr val="accent1">
                     <a:lumMod val="50000"/>
@@ -4396,7 +4486,7 @@
         </p:nvSpPr>
         <p:spPr>
           <a:xfrm>
-            <a:off x="84082" y="1101194"/>
+            <a:off x="5154875" y="1053769"/>
             <a:ext cx="1882247" cy="369332"/>
           </a:xfrm>
           <a:prstGeom prst="rect">
@@ -4431,7 +4521,7 @@
         </p:nvSpPr>
         <p:spPr>
           <a:xfrm>
-            <a:off x="852256" y="2565647"/>
+            <a:off x="852180" y="2479003"/>
             <a:ext cx="2228295" cy="707886"/>
           </a:xfrm>
           <a:prstGeom prst="rect">
@@ -4446,18 +4536,13 @@
           <a:lstStyle/>
           <a:p>
             <a:r>
-              <a:rPr lang="ko-KR" altLang="en-US" sz="4000" b="1">
+              <a:rPr lang="ko-KR" altLang="en-US" sz="4000" b="1" dirty="0">
                 <a:solidFill>
                   <a:schemeClr val="bg1"/>
                 </a:solidFill>
               </a:rPr>
               <a:t>공연예술</a:t>
             </a:r>
-            <a:endParaRPr lang="ko-KR" altLang="en-US" sz="4000" b="1" dirty="0">
-              <a:solidFill>
-                <a:schemeClr val="bg1"/>
-              </a:solidFill>
-            </a:endParaRPr>
           </a:p>
         </p:txBody>
       </p:sp>
@@ -4530,6 +4615,41 @@
                 <a:ea typeface="아임크리수진" panose="00000500000000000000" pitchFamily="2" charset="-127"/>
               </a:rPr>
               <a:t>우 학 동</a:t>
+            </a:r>
+          </a:p>
+        </p:txBody>
+      </p:sp>
+      <p:sp>
+        <p:nvSpPr>
+          <p:cNvPr id="10" name="TextBox 9">
+            <a:extLst>
+              <a:ext uri="{FF2B5EF4-FFF2-40B4-BE49-F238E27FC236}">
+                <a16:creationId xmlns:a16="http://schemas.microsoft.com/office/drawing/2014/main" id="{561F3E61-2FA5-4F66-B1A2-AADD0567D63F}"/>
+              </a:ext>
+            </a:extLst>
+          </p:cNvPr>
+          <p:cNvSpPr txBox="1"/>
+          <p:nvPr/>
+        </p:nvSpPr>
+        <p:spPr>
+          <a:xfrm>
+            <a:off x="905408" y="3147892"/>
+            <a:ext cx="2121838" cy="523220"/>
+          </a:xfrm>
+          <a:prstGeom prst="rect">
+            <a:avLst/>
+          </a:prstGeom>
+          <a:noFill/>
+        </p:spPr>
+        <p:txBody>
+          <a:bodyPr wrap="square" rtlCol="0">
+            <a:spAutoFit/>
+          </a:bodyPr>
+          <a:lstStyle/>
+          <a:p>
+            <a:r>
+              <a:rPr lang="ko-KR" altLang="en-US" sz="1400" b="1" dirty="0"/>
+              <a:t>무대에서 축제를 즐기는 사람들</a:t>
             </a:r>
           </a:p>
         </p:txBody>
@@ -4548,6 +4668,2561 @@
 </file>
 
 <file path=ppt/slides/slide3.xml><?xml version="1.0" encoding="utf-8"?>
+<p:sld xmlns:a="http://schemas.openxmlformats.org/drawingml/2006/main" xmlns:r="http://schemas.openxmlformats.org/officeDocument/2006/relationships" xmlns:p="http://schemas.openxmlformats.org/presentationml/2006/main">
+  <p:cSld>
+    <p:spTree>
+      <p:nvGrpSpPr>
+        <p:cNvPr id="1" name=""/>
+        <p:cNvGrpSpPr/>
+        <p:nvPr/>
+      </p:nvGrpSpPr>
+      <p:grpSpPr>
+        <a:xfrm>
+          <a:off x="0" y="0"/>
+          <a:ext cx="0" cy="0"/>
+          <a:chOff x="0" y="0"/>
+          <a:chExt cx="0" cy="0"/>
+        </a:xfrm>
+      </p:grpSpPr>
+      <p:sp>
+        <p:nvSpPr>
+          <p:cNvPr id="8" name="직사각형 7">
+            <a:extLst>
+              <a:ext uri="{FF2B5EF4-FFF2-40B4-BE49-F238E27FC236}">
+                <a16:creationId xmlns:a16="http://schemas.microsoft.com/office/drawing/2014/main" id="{9432D078-7EBF-46FA-8DE4-60A2722C6E3D}"/>
+              </a:ext>
+            </a:extLst>
+          </p:cNvPr>
+          <p:cNvSpPr/>
+          <p:nvPr/>
+        </p:nvSpPr>
+        <p:spPr>
+          <a:xfrm>
+            <a:off x="4077377" y="825624"/>
+            <a:ext cx="4037243" cy="3613043"/>
+          </a:xfrm>
+          <a:prstGeom prst="rect">
+            <a:avLst/>
+          </a:prstGeom>
+          <a:noFill/>
+          <a:ln>
+            <a:solidFill>
+              <a:schemeClr val="bg1">
+                <a:lumMod val="50000"/>
+              </a:schemeClr>
+            </a:solidFill>
+          </a:ln>
+        </p:spPr>
+        <p:style>
+          <a:lnRef idx="2">
+            <a:schemeClr val="accent1">
+              <a:shade val="50000"/>
+            </a:schemeClr>
+          </a:lnRef>
+          <a:fillRef idx="1">
+            <a:schemeClr val="accent1"/>
+          </a:fillRef>
+          <a:effectRef idx="0">
+            <a:schemeClr val="accent1"/>
+          </a:effectRef>
+          <a:fontRef idx="minor">
+            <a:schemeClr val="lt1"/>
+          </a:fontRef>
+        </p:style>
+        <p:txBody>
+          <a:bodyPr rtlCol="0" anchor="ctr"/>
+          <a:lstStyle/>
+          <a:p>
+            <a:pPr algn="ctr"/>
+            <a:r>
+              <a:rPr lang="ko-KR" altLang="en-US" dirty="0">
+                <a:solidFill>
+                  <a:schemeClr val="tx1"/>
+                </a:solidFill>
+              </a:rPr>
+              <a:t>전체 동아리 일정</a:t>
+            </a:r>
+          </a:p>
+        </p:txBody>
+      </p:sp>
+      <p:cxnSp>
+        <p:nvCxnSpPr>
+          <p:cNvPr id="5" name="직선 연결선 4">
+            <a:extLst>
+              <a:ext uri="{FF2B5EF4-FFF2-40B4-BE49-F238E27FC236}">
+                <a16:creationId xmlns:a16="http://schemas.microsoft.com/office/drawing/2014/main" id="{1325E981-3FF4-4A21-8ECF-B07056121B5C}"/>
+              </a:ext>
+            </a:extLst>
+          </p:cNvPr>
+          <p:cNvCxnSpPr>
+            <a:cxnSpLocks/>
+          </p:cNvCxnSpPr>
+          <p:nvPr/>
+        </p:nvCxnSpPr>
+        <p:spPr>
+          <a:xfrm>
+            <a:off x="0" y="825623"/>
+            <a:ext cx="12192000" cy="0"/>
+          </a:xfrm>
+          <a:prstGeom prst="line">
+            <a:avLst/>
+          </a:prstGeom>
+          <a:ln w="19050">
+            <a:solidFill>
+              <a:srgbClr val="8B8A86"/>
+            </a:solidFill>
+          </a:ln>
+        </p:spPr>
+        <p:style>
+          <a:lnRef idx="1">
+            <a:schemeClr val="accent1"/>
+          </a:lnRef>
+          <a:fillRef idx="0">
+            <a:schemeClr val="accent1"/>
+          </a:fillRef>
+          <a:effectRef idx="0">
+            <a:schemeClr val="accent1"/>
+          </a:effectRef>
+          <a:fontRef idx="minor">
+            <a:schemeClr val="tx1"/>
+          </a:fontRef>
+        </p:style>
+      </p:cxnSp>
+      <p:sp>
+        <p:nvSpPr>
+          <p:cNvPr id="7" name="TextBox 6">
+            <a:extLst>
+              <a:ext uri="{FF2B5EF4-FFF2-40B4-BE49-F238E27FC236}">
+                <a16:creationId xmlns:a16="http://schemas.microsoft.com/office/drawing/2014/main" id="{9DAB59B5-5CB9-4E0A-9118-4E8C123D32AD}"/>
+              </a:ext>
+            </a:extLst>
+          </p:cNvPr>
+          <p:cNvSpPr txBox="1"/>
+          <p:nvPr/>
+        </p:nvSpPr>
+        <p:spPr>
+          <a:xfrm>
+            <a:off x="11144251" y="177547"/>
+            <a:ext cx="1047750" cy="553998"/>
+          </a:xfrm>
+          <a:prstGeom prst="rect">
+            <a:avLst/>
+          </a:prstGeom>
+          <a:noFill/>
+        </p:spPr>
+        <p:txBody>
+          <a:bodyPr wrap="square" rtlCol="0">
+            <a:spAutoFit/>
+          </a:bodyPr>
+          <a:lstStyle/>
+          <a:p>
+            <a:r>
+              <a:rPr lang="ko-KR" altLang="en-US" sz="1500" dirty="0">
+                <a:latin typeface="아임크리수진" panose="00000500000000000000" pitchFamily="2" charset="-127"/>
+                <a:ea typeface="아임크리수진" panose="00000500000000000000" pitchFamily="2" charset="-127"/>
+              </a:rPr>
+              <a:t>로그인</a:t>
+            </a:r>
+            <a:r>
+              <a:rPr lang="en-US" altLang="ko-KR" sz="1500" dirty="0">
+                <a:latin typeface="아임크리수진" panose="00000500000000000000" pitchFamily="2" charset="-127"/>
+                <a:ea typeface="아임크리수진" panose="00000500000000000000" pitchFamily="2" charset="-127"/>
+              </a:rPr>
+              <a:t>/</a:t>
+            </a:r>
+          </a:p>
+          <a:p>
+            <a:r>
+              <a:rPr lang="ko-KR" altLang="en-US" sz="1500" dirty="0">
+                <a:latin typeface="아임크리수진" panose="00000500000000000000" pitchFamily="2" charset="-127"/>
+                <a:ea typeface="아임크리수진" panose="00000500000000000000" pitchFamily="2" charset="-127"/>
+              </a:rPr>
+              <a:t>회원가입</a:t>
+            </a:r>
+          </a:p>
+        </p:txBody>
+      </p:sp>
+      <p:sp>
+        <p:nvSpPr>
+          <p:cNvPr id="20" name="TextBox 19">
+            <a:extLst>
+              <a:ext uri="{FF2B5EF4-FFF2-40B4-BE49-F238E27FC236}">
+                <a16:creationId xmlns:a16="http://schemas.microsoft.com/office/drawing/2014/main" id="{14221B33-91FE-40D2-9616-AAF5423D933B}"/>
+              </a:ext>
+            </a:extLst>
+          </p:cNvPr>
+          <p:cNvSpPr txBox="1"/>
+          <p:nvPr/>
+        </p:nvSpPr>
+        <p:spPr>
+          <a:xfrm>
+            <a:off x="71021" y="177547"/>
+            <a:ext cx="1576804" cy="523220"/>
+          </a:xfrm>
+          <a:prstGeom prst="rect">
+            <a:avLst/>
+          </a:prstGeom>
+          <a:noFill/>
+        </p:spPr>
+        <p:txBody>
+          <a:bodyPr wrap="square" rtlCol="0">
+            <a:spAutoFit/>
+          </a:bodyPr>
+          <a:lstStyle/>
+          <a:p>
+            <a:r>
+              <a:rPr lang="ko-KR" altLang="en-US" sz="2800" dirty="0">
+                <a:latin typeface="아임크리수진" panose="00000500000000000000" pitchFamily="2" charset="-127"/>
+                <a:ea typeface="아임크리수진" panose="00000500000000000000" pitchFamily="2" charset="-127"/>
+              </a:rPr>
+              <a:t>우 학 동</a:t>
+            </a:r>
+          </a:p>
+        </p:txBody>
+      </p:sp>
+      <p:sp>
+        <p:nvSpPr>
+          <p:cNvPr id="4" name="직사각형 3">
+            <a:extLst>
+              <a:ext uri="{FF2B5EF4-FFF2-40B4-BE49-F238E27FC236}">
+                <a16:creationId xmlns:a16="http://schemas.microsoft.com/office/drawing/2014/main" id="{4AF286EF-E582-4462-B6CF-667340D808F3}"/>
+              </a:ext>
+            </a:extLst>
+          </p:cNvPr>
+          <p:cNvSpPr/>
+          <p:nvPr/>
+        </p:nvSpPr>
+        <p:spPr>
+          <a:xfrm>
+            <a:off x="0" y="4438667"/>
+            <a:ext cx="12192000" cy="2409806"/>
+          </a:xfrm>
+          <a:prstGeom prst="rect">
+            <a:avLst/>
+          </a:prstGeom>
+        </p:spPr>
+        <p:style>
+          <a:lnRef idx="2">
+            <a:schemeClr val="dk1">
+              <a:shade val="50000"/>
+            </a:schemeClr>
+          </a:lnRef>
+          <a:fillRef idx="1">
+            <a:schemeClr val="dk1"/>
+          </a:fillRef>
+          <a:effectRef idx="0">
+            <a:schemeClr val="dk1"/>
+          </a:effectRef>
+          <a:fontRef idx="minor">
+            <a:schemeClr val="lt1"/>
+          </a:fontRef>
+        </p:style>
+        <p:txBody>
+          <a:bodyPr rtlCol="0" anchor="ctr"/>
+          <a:lstStyle/>
+          <a:p>
+            <a:pPr algn="ctr"/>
+            <a:endParaRPr lang="ko-KR" altLang="en-US" dirty="0"/>
+          </a:p>
+        </p:txBody>
+      </p:sp>
+      <p:sp>
+        <p:nvSpPr>
+          <p:cNvPr id="6" name="TextBox 5">
+            <a:extLst>
+              <a:ext uri="{FF2B5EF4-FFF2-40B4-BE49-F238E27FC236}">
+                <a16:creationId xmlns:a16="http://schemas.microsoft.com/office/drawing/2014/main" id="{50A5F1B9-C9BF-4A6C-B0C6-713D24A51F45}"/>
+              </a:ext>
+            </a:extLst>
+          </p:cNvPr>
+          <p:cNvSpPr txBox="1"/>
+          <p:nvPr/>
+        </p:nvSpPr>
+        <p:spPr>
+          <a:xfrm>
+            <a:off x="1963237" y="4804290"/>
+            <a:ext cx="647700" cy="369332"/>
+          </a:xfrm>
+          <a:prstGeom prst="rect">
+            <a:avLst/>
+          </a:prstGeom>
+          <a:noFill/>
+        </p:spPr>
+        <p:txBody>
+          <a:bodyPr wrap="square" rtlCol="0">
+            <a:spAutoFit/>
+          </a:bodyPr>
+          <a:lstStyle/>
+          <a:p>
+            <a:r>
+              <a:rPr lang="ko-KR" altLang="en-US" dirty="0">
+                <a:solidFill>
+                  <a:schemeClr val="bg1"/>
+                </a:solidFill>
+              </a:rPr>
+              <a:t>기획</a:t>
+            </a:r>
+          </a:p>
+        </p:txBody>
+      </p:sp>
+      <p:sp>
+        <p:nvSpPr>
+          <p:cNvPr id="13" name="TextBox 12">
+            <a:extLst>
+              <a:ext uri="{FF2B5EF4-FFF2-40B4-BE49-F238E27FC236}">
+                <a16:creationId xmlns:a16="http://schemas.microsoft.com/office/drawing/2014/main" id="{3BC0872A-2043-45A2-9874-38786E6BDB1E}"/>
+              </a:ext>
+            </a:extLst>
+          </p:cNvPr>
+          <p:cNvSpPr txBox="1"/>
+          <p:nvPr/>
+        </p:nvSpPr>
+        <p:spPr>
+          <a:xfrm>
+            <a:off x="5772149" y="4762500"/>
+            <a:ext cx="647701" cy="369332"/>
+          </a:xfrm>
+          <a:prstGeom prst="rect">
+            <a:avLst/>
+          </a:prstGeom>
+          <a:noFill/>
+        </p:spPr>
+        <p:txBody>
+          <a:bodyPr wrap="square" rtlCol="0">
+            <a:spAutoFit/>
+          </a:bodyPr>
+          <a:lstStyle/>
+          <a:p>
+            <a:r>
+              <a:rPr lang="ko-KR" altLang="en-US">
+                <a:solidFill>
+                  <a:schemeClr val="bg1"/>
+                </a:solidFill>
+              </a:rPr>
+              <a:t>위치</a:t>
+            </a:r>
+            <a:endParaRPr lang="ko-KR" altLang="en-US" dirty="0">
+              <a:solidFill>
+                <a:schemeClr val="bg1"/>
+              </a:solidFill>
+            </a:endParaRPr>
+          </a:p>
+        </p:txBody>
+      </p:sp>
+      <p:sp>
+        <p:nvSpPr>
+          <p:cNvPr id="14" name="TextBox 13">
+            <a:extLst>
+              <a:ext uri="{FF2B5EF4-FFF2-40B4-BE49-F238E27FC236}">
+                <a16:creationId xmlns:a16="http://schemas.microsoft.com/office/drawing/2014/main" id="{95D672FC-9E93-4A8E-907C-517C529B69AF}"/>
+              </a:ext>
+            </a:extLst>
+          </p:cNvPr>
+          <p:cNvSpPr txBox="1"/>
+          <p:nvPr/>
+        </p:nvSpPr>
+        <p:spPr>
+          <a:xfrm>
+            <a:off x="9695905" y="4762500"/>
+            <a:ext cx="647701" cy="369332"/>
+          </a:xfrm>
+          <a:prstGeom prst="rect">
+            <a:avLst/>
+          </a:prstGeom>
+          <a:noFill/>
+        </p:spPr>
+        <p:txBody>
+          <a:bodyPr wrap="square" rtlCol="0">
+            <a:spAutoFit/>
+          </a:bodyPr>
+          <a:lstStyle/>
+          <a:p>
+            <a:r>
+              <a:rPr lang="ko-KR" altLang="en-US" dirty="0">
+                <a:solidFill>
+                  <a:schemeClr val="bg1"/>
+                </a:solidFill>
+              </a:rPr>
+              <a:t>문의</a:t>
+            </a:r>
+          </a:p>
+        </p:txBody>
+      </p:sp>
+      <p:sp>
+        <p:nvSpPr>
+          <p:cNvPr id="17" name="TextBox 16">
+            <a:extLst>
+              <a:ext uri="{FF2B5EF4-FFF2-40B4-BE49-F238E27FC236}">
+                <a16:creationId xmlns:a16="http://schemas.microsoft.com/office/drawing/2014/main" id="{B2DA2434-CBD1-4102-99A9-5D2033CCDDA8}"/>
+              </a:ext>
+            </a:extLst>
+          </p:cNvPr>
+          <p:cNvSpPr txBox="1"/>
+          <p:nvPr/>
+        </p:nvSpPr>
+        <p:spPr>
+          <a:xfrm>
+            <a:off x="535573" y="5192672"/>
+            <a:ext cx="3503028" cy="923330"/>
+          </a:xfrm>
+          <a:prstGeom prst="rect">
+            <a:avLst/>
+          </a:prstGeom>
+          <a:noFill/>
+        </p:spPr>
+        <p:txBody>
+          <a:bodyPr wrap="square" rtlCol="0">
+            <a:spAutoFit/>
+          </a:bodyPr>
+          <a:lstStyle/>
+          <a:p>
+            <a:r>
+              <a:rPr lang="en-US" altLang="ko-KR" dirty="0">
+                <a:solidFill>
+                  <a:schemeClr val="bg1"/>
+                </a:solidFill>
+              </a:rPr>
+              <a:t>11111111111111111111111111</a:t>
+            </a:r>
+          </a:p>
+          <a:p>
+            <a:r>
+              <a:rPr lang="en-US" altLang="ko-KR" dirty="0">
+                <a:solidFill>
+                  <a:schemeClr val="bg1"/>
+                </a:solidFill>
+              </a:rPr>
+              <a:t>11111111111111111111111111</a:t>
+            </a:r>
+          </a:p>
+          <a:p>
+            <a:endParaRPr lang="ko-KR" altLang="en-US" dirty="0">
+              <a:solidFill>
+                <a:schemeClr val="bg1"/>
+              </a:solidFill>
+            </a:endParaRPr>
+          </a:p>
+        </p:txBody>
+      </p:sp>
+      <p:sp>
+        <p:nvSpPr>
+          <p:cNvPr id="19" name="TextBox 18">
+            <a:extLst>
+              <a:ext uri="{FF2B5EF4-FFF2-40B4-BE49-F238E27FC236}">
+                <a16:creationId xmlns:a16="http://schemas.microsoft.com/office/drawing/2014/main" id="{CB79EFEB-37C0-4D13-9938-1EFEC6E111A2}"/>
+              </a:ext>
+            </a:extLst>
+          </p:cNvPr>
+          <p:cNvSpPr txBox="1"/>
+          <p:nvPr/>
+        </p:nvSpPr>
+        <p:spPr>
+          <a:xfrm>
+            <a:off x="4344485" y="5192672"/>
+            <a:ext cx="3503028" cy="1200329"/>
+          </a:xfrm>
+          <a:prstGeom prst="rect">
+            <a:avLst/>
+          </a:prstGeom>
+          <a:noFill/>
+        </p:spPr>
+        <p:txBody>
+          <a:bodyPr wrap="square" rtlCol="0">
+            <a:spAutoFit/>
+          </a:bodyPr>
+          <a:lstStyle/>
+          <a:p>
+            <a:r>
+              <a:rPr lang="en-US" altLang="ko-KR" dirty="0">
+                <a:solidFill>
+                  <a:schemeClr val="bg1"/>
+                </a:solidFill>
+              </a:rPr>
+              <a:t>222222222222222222222222222222222222222222222222222222222222</a:t>
+            </a:r>
+          </a:p>
+          <a:p>
+            <a:endParaRPr lang="ko-KR" altLang="en-US" dirty="0">
+              <a:solidFill>
+                <a:schemeClr val="bg1"/>
+              </a:solidFill>
+            </a:endParaRPr>
+          </a:p>
+        </p:txBody>
+      </p:sp>
+      <p:sp>
+        <p:nvSpPr>
+          <p:cNvPr id="21" name="TextBox 20">
+            <a:extLst>
+              <a:ext uri="{FF2B5EF4-FFF2-40B4-BE49-F238E27FC236}">
+                <a16:creationId xmlns:a16="http://schemas.microsoft.com/office/drawing/2014/main" id="{69A8A7B0-4C18-4A17-BACD-EFD9F07FE6D7}"/>
+              </a:ext>
+            </a:extLst>
+          </p:cNvPr>
+          <p:cNvSpPr txBox="1"/>
+          <p:nvPr/>
+        </p:nvSpPr>
+        <p:spPr>
+          <a:xfrm>
+            <a:off x="8268242" y="5192672"/>
+            <a:ext cx="3503028" cy="923330"/>
+          </a:xfrm>
+          <a:prstGeom prst="rect">
+            <a:avLst/>
+          </a:prstGeom>
+          <a:noFill/>
+        </p:spPr>
+        <p:txBody>
+          <a:bodyPr wrap="square" rtlCol="0">
+            <a:spAutoFit/>
+          </a:bodyPr>
+          <a:lstStyle/>
+          <a:p>
+            <a:r>
+              <a:rPr lang="en-US" altLang="ko-KR" dirty="0">
+                <a:solidFill>
+                  <a:schemeClr val="bg1"/>
+                </a:solidFill>
+              </a:rPr>
+              <a:t>33333333333333333333333333333333333</a:t>
+            </a:r>
+          </a:p>
+          <a:p>
+            <a:endParaRPr lang="ko-KR" altLang="en-US" dirty="0">
+              <a:solidFill>
+                <a:schemeClr val="bg1"/>
+              </a:solidFill>
+            </a:endParaRPr>
+          </a:p>
+        </p:txBody>
+      </p:sp>
+      <p:sp>
+        <p:nvSpPr>
+          <p:cNvPr id="22" name="직사각형 21">
+            <a:extLst>
+              <a:ext uri="{FF2B5EF4-FFF2-40B4-BE49-F238E27FC236}">
+                <a16:creationId xmlns:a16="http://schemas.microsoft.com/office/drawing/2014/main" id="{0D3C41C2-68B3-4031-B712-1B5336E4B734}"/>
+              </a:ext>
+            </a:extLst>
+          </p:cNvPr>
+          <p:cNvSpPr/>
+          <p:nvPr/>
+        </p:nvSpPr>
+        <p:spPr>
+          <a:xfrm>
+            <a:off x="1" y="824033"/>
+            <a:ext cx="4037244" cy="3613039"/>
+          </a:xfrm>
+          <a:prstGeom prst="rect">
+            <a:avLst/>
+          </a:prstGeom>
+          <a:noFill/>
+          <a:ln>
+            <a:solidFill>
+              <a:schemeClr val="bg1">
+                <a:lumMod val="50000"/>
+              </a:schemeClr>
+            </a:solidFill>
+          </a:ln>
+        </p:spPr>
+        <p:style>
+          <a:lnRef idx="2">
+            <a:schemeClr val="accent1">
+              <a:shade val="50000"/>
+            </a:schemeClr>
+          </a:lnRef>
+          <a:fillRef idx="1">
+            <a:schemeClr val="accent1"/>
+          </a:fillRef>
+          <a:effectRef idx="0">
+            <a:schemeClr val="accent1"/>
+          </a:effectRef>
+          <a:fontRef idx="minor">
+            <a:schemeClr val="lt1"/>
+          </a:fontRef>
+        </p:style>
+        <p:txBody>
+          <a:bodyPr rtlCol="0" anchor="ctr"/>
+          <a:lstStyle/>
+          <a:p>
+            <a:pPr algn="ctr"/>
+            <a:r>
+              <a:rPr lang="ko-KR" altLang="en-US" dirty="0">
+                <a:solidFill>
+                  <a:schemeClr val="tx1"/>
+                </a:solidFill>
+              </a:rPr>
+              <a:t>공지사항</a:t>
+            </a:r>
+          </a:p>
+        </p:txBody>
+      </p:sp>
+      <p:sp>
+        <p:nvSpPr>
+          <p:cNvPr id="23" name="직사각형 22">
+            <a:extLst>
+              <a:ext uri="{FF2B5EF4-FFF2-40B4-BE49-F238E27FC236}">
+                <a16:creationId xmlns:a16="http://schemas.microsoft.com/office/drawing/2014/main" id="{8808A02F-1A31-42E7-8763-C08CAD16E841}"/>
+              </a:ext>
+            </a:extLst>
+          </p:cNvPr>
+          <p:cNvSpPr/>
+          <p:nvPr/>
+        </p:nvSpPr>
+        <p:spPr>
+          <a:xfrm>
+            <a:off x="8144958" y="824033"/>
+            <a:ext cx="4037243" cy="3613043"/>
+          </a:xfrm>
+          <a:prstGeom prst="rect">
+            <a:avLst/>
+          </a:prstGeom>
+          <a:noFill/>
+          <a:ln>
+            <a:solidFill>
+              <a:schemeClr val="bg1">
+                <a:lumMod val="50000"/>
+              </a:schemeClr>
+            </a:solidFill>
+          </a:ln>
+        </p:spPr>
+        <p:style>
+          <a:lnRef idx="2">
+            <a:schemeClr val="accent1">
+              <a:shade val="50000"/>
+            </a:schemeClr>
+          </a:lnRef>
+          <a:fillRef idx="1">
+            <a:schemeClr val="accent1"/>
+          </a:fillRef>
+          <a:effectRef idx="0">
+            <a:schemeClr val="accent1"/>
+          </a:effectRef>
+          <a:fontRef idx="minor">
+            <a:schemeClr val="lt1"/>
+          </a:fontRef>
+        </p:style>
+        <p:txBody>
+          <a:bodyPr rtlCol="0" anchor="ctr"/>
+          <a:lstStyle/>
+          <a:p>
+            <a:pPr algn="ctr"/>
+            <a:r>
+              <a:rPr lang="ko-KR" altLang="en-US" dirty="0">
+                <a:solidFill>
+                  <a:schemeClr val="tx1"/>
+                </a:solidFill>
+              </a:rPr>
+              <a:t>커뮤니티</a:t>
+            </a:r>
+          </a:p>
+        </p:txBody>
+      </p:sp>
+    </p:spTree>
+    <p:extLst>
+      <p:ext uri="{BB962C8B-B14F-4D97-AF65-F5344CB8AC3E}">
+        <p14:creationId xmlns:p14="http://schemas.microsoft.com/office/powerpoint/2010/main" val="1773210651"/>
+      </p:ext>
+    </p:extLst>
+  </p:cSld>
+  <p:clrMapOvr>
+    <a:masterClrMapping/>
+  </p:clrMapOvr>
+</p:sld>
+</file>
+
+<file path=ppt/slides/slide4.xml><?xml version="1.0" encoding="utf-8"?>
+<p:sld xmlns:a="http://schemas.openxmlformats.org/drawingml/2006/main" xmlns:r="http://schemas.openxmlformats.org/officeDocument/2006/relationships" xmlns:p="http://schemas.openxmlformats.org/presentationml/2006/main">
+  <p:cSld>
+    <p:spTree>
+      <p:nvGrpSpPr>
+        <p:cNvPr id="1" name=""/>
+        <p:cNvGrpSpPr/>
+        <p:nvPr/>
+      </p:nvGrpSpPr>
+      <p:grpSpPr>
+        <a:xfrm>
+          <a:off x="0" y="0"/>
+          <a:ext cx="0" cy="0"/>
+          <a:chOff x="0" y="0"/>
+          <a:chExt cx="0" cy="0"/>
+        </a:xfrm>
+      </p:grpSpPr>
+      <p:cxnSp>
+        <p:nvCxnSpPr>
+          <p:cNvPr id="13" name="직선 연결선 12">
+            <a:extLst>
+              <a:ext uri="{FF2B5EF4-FFF2-40B4-BE49-F238E27FC236}">
+                <a16:creationId xmlns:a16="http://schemas.microsoft.com/office/drawing/2014/main" id="{24E23260-6DED-4318-BE75-DA9DA338BB0C}"/>
+              </a:ext>
+            </a:extLst>
+          </p:cNvPr>
+          <p:cNvCxnSpPr>
+            <a:cxnSpLocks/>
+          </p:cNvCxnSpPr>
+          <p:nvPr/>
+        </p:nvCxnSpPr>
+        <p:spPr>
+          <a:xfrm>
+            <a:off x="0" y="825623"/>
+            <a:ext cx="12192000" cy="0"/>
+          </a:xfrm>
+          <a:prstGeom prst="line">
+            <a:avLst/>
+          </a:prstGeom>
+          <a:ln w="19050">
+            <a:solidFill>
+              <a:srgbClr val="8B8A86"/>
+            </a:solidFill>
+          </a:ln>
+        </p:spPr>
+        <p:style>
+          <a:lnRef idx="1">
+            <a:schemeClr val="accent1"/>
+          </a:lnRef>
+          <a:fillRef idx="0">
+            <a:schemeClr val="accent1"/>
+          </a:fillRef>
+          <a:effectRef idx="0">
+            <a:schemeClr val="accent1"/>
+          </a:effectRef>
+          <a:fontRef idx="minor">
+            <a:schemeClr val="tx1"/>
+          </a:fontRef>
+        </p:style>
+      </p:cxnSp>
+      <p:sp>
+        <p:nvSpPr>
+          <p:cNvPr id="17" name="TextBox 16">
+            <a:extLst>
+              <a:ext uri="{FF2B5EF4-FFF2-40B4-BE49-F238E27FC236}">
+                <a16:creationId xmlns:a16="http://schemas.microsoft.com/office/drawing/2014/main" id="{D62DA48E-2BC9-438E-BBE4-C1D6796640F2}"/>
+              </a:ext>
+            </a:extLst>
+          </p:cNvPr>
+          <p:cNvSpPr txBox="1"/>
+          <p:nvPr/>
+        </p:nvSpPr>
+        <p:spPr>
+          <a:xfrm>
+            <a:off x="71021" y="177547"/>
+            <a:ext cx="1576804" cy="523220"/>
+          </a:xfrm>
+          <a:prstGeom prst="rect">
+            <a:avLst/>
+          </a:prstGeom>
+          <a:noFill/>
+        </p:spPr>
+        <p:txBody>
+          <a:bodyPr wrap="square" rtlCol="0">
+            <a:spAutoFit/>
+          </a:bodyPr>
+          <a:lstStyle/>
+          <a:p>
+            <a:r>
+              <a:rPr lang="ko-KR" altLang="en-US" sz="2800" dirty="0">
+                <a:latin typeface="아임크리수진" panose="00000500000000000000" pitchFamily="2" charset="-127"/>
+                <a:ea typeface="아임크리수진" panose="00000500000000000000" pitchFamily="2" charset="-127"/>
+              </a:rPr>
+              <a:t>우 학 동</a:t>
+            </a:r>
+          </a:p>
+        </p:txBody>
+      </p:sp>
+      <p:sp>
+        <p:nvSpPr>
+          <p:cNvPr id="15" name="TextBox 14">
+            <a:extLst>
+              <a:ext uri="{FF2B5EF4-FFF2-40B4-BE49-F238E27FC236}">
+                <a16:creationId xmlns:a16="http://schemas.microsoft.com/office/drawing/2014/main" id="{74A7B761-F846-4062-85FD-F4655D394A30}"/>
+              </a:ext>
+            </a:extLst>
+          </p:cNvPr>
+          <p:cNvSpPr txBox="1"/>
+          <p:nvPr/>
+        </p:nvSpPr>
+        <p:spPr>
+          <a:xfrm>
+            <a:off x="11144251" y="177547"/>
+            <a:ext cx="1047750" cy="553998"/>
+          </a:xfrm>
+          <a:prstGeom prst="rect">
+            <a:avLst/>
+          </a:prstGeom>
+          <a:noFill/>
+        </p:spPr>
+        <p:txBody>
+          <a:bodyPr wrap="square" rtlCol="0">
+            <a:spAutoFit/>
+          </a:bodyPr>
+          <a:lstStyle/>
+          <a:p>
+            <a:r>
+              <a:rPr lang="ko-KR" altLang="en-US" sz="1500" dirty="0">
+                <a:latin typeface="아임크리수진" panose="00000500000000000000" pitchFamily="2" charset="-127"/>
+                <a:ea typeface="아임크리수진" panose="00000500000000000000" pitchFamily="2" charset="-127"/>
+              </a:rPr>
+              <a:t>로그인</a:t>
+            </a:r>
+            <a:r>
+              <a:rPr lang="en-US" altLang="ko-KR" sz="1500" dirty="0">
+                <a:latin typeface="아임크리수진" panose="00000500000000000000" pitchFamily="2" charset="-127"/>
+                <a:ea typeface="아임크리수진" panose="00000500000000000000" pitchFamily="2" charset="-127"/>
+              </a:rPr>
+              <a:t>/</a:t>
+            </a:r>
+          </a:p>
+          <a:p>
+            <a:r>
+              <a:rPr lang="ko-KR" altLang="en-US" sz="1500" dirty="0">
+                <a:latin typeface="아임크리수진" panose="00000500000000000000" pitchFamily="2" charset="-127"/>
+                <a:ea typeface="아임크리수진" panose="00000500000000000000" pitchFamily="2" charset="-127"/>
+              </a:rPr>
+              <a:t>회원가입</a:t>
+            </a:r>
+          </a:p>
+        </p:txBody>
+      </p:sp>
+    </p:spTree>
+    <p:extLst>
+      <p:ext uri="{BB962C8B-B14F-4D97-AF65-F5344CB8AC3E}">
+        <p14:creationId xmlns:p14="http://schemas.microsoft.com/office/powerpoint/2010/main" val="3903674954"/>
+      </p:ext>
+    </p:extLst>
+  </p:cSld>
+  <p:clrMapOvr>
+    <a:masterClrMapping/>
+  </p:clrMapOvr>
+</p:sld>
+</file>
+
+<file path=ppt/slides/slide5.xml><?xml version="1.0" encoding="utf-8"?>
+<p:sld xmlns:a="http://schemas.openxmlformats.org/drawingml/2006/main" xmlns:r="http://schemas.openxmlformats.org/officeDocument/2006/relationships" xmlns:p="http://schemas.openxmlformats.org/presentationml/2006/main">
+  <p:cSld>
+    <p:spTree>
+      <p:nvGrpSpPr>
+        <p:cNvPr id="1" name=""/>
+        <p:cNvGrpSpPr/>
+        <p:nvPr/>
+      </p:nvGrpSpPr>
+      <p:grpSpPr>
+        <a:xfrm>
+          <a:off x="0" y="0"/>
+          <a:ext cx="0" cy="0"/>
+          <a:chOff x="0" y="0"/>
+          <a:chExt cx="0" cy="0"/>
+        </a:xfrm>
+      </p:grpSpPr>
+      <p:cxnSp>
+        <p:nvCxnSpPr>
+          <p:cNvPr id="5" name="직선 연결선 4">
+            <a:extLst>
+              <a:ext uri="{FF2B5EF4-FFF2-40B4-BE49-F238E27FC236}">
+                <a16:creationId xmlns:a16="http://schemas.microsoft.com/office/drawing/2014/main" id="{1325E981-3FF4-4A21-8ECF-B07056121B5C}"/>
+              </a:ext>
+            </a:extLst>
+          </p:cNvPr>
+          <p:cNvCxnSpPr>
+            <a:cxnSpLocks/>
+          </p:cNvCxnSpPr>
+          <p:nvPr/>
+        </p:nvCxnSpPr>
+        <p:spPr>
+          <a:xfrm>
+            <a:off x="0" y="825623"/>
+            <a:ext cx="12192000" cy="0"/>
+          </a:xfrm>
+          <a:prstGeom prst="line">
+            <a:avLst/>
+          </a:prstGeom>
+          <a:ln w="19050">
+            <a:solidFill>
+              <a:srgbClr val="8B8A86"/>
+            </a:solidFill>
+          </a:ln>
+        </p:spPr>
+        <p:style>
+          <a:lnRef idx="1">
+            <a:schemeClr val="accent1"/>
+          </a:lnRef>
+          <a:fillRef idx="0">
+            <a:schemeClr val="accent1"/>
+          </a:fillRef>
+          <a:effectRef idx="0">
+            <a:schemeClr val="accent1"/>
+          </a:effectRef>
+          <a:fontRef idx="minor">
+            <a:schemeClr val="tx1"/>
+          </a:fontRef>
+        </p:style>
+      </p:cxnSp>
+      <p:sp>
+        <p:nvSpPr>
+          <p:cNvPr id="7" name="TextBox 6">
+            <a:extLst>
+              <a:ext uri="{FF2B5EF4-FFF2-40B4-BE49-F238E27FC236}">
+                <a16:creationId xmlns:a16="http://schemas.microsoft.com/office/drawing/2014/main" id="{9DAB59B5-5CB9-4E0A-9118-4E8C123D32AD}"/>
+              </a:ext>
+            </a:extLst>
+          </p:cNvPr>
+          <p:cNvSpPr txBox="1"/>
+          <p:nvPr/>
+        </p:nvSpPr>
+        <p:spPr>
+          <a:xfrm>
+            <a:off x="11144251" y="177547"/>
+            <a:ext cx="1047750" cy="553998"/>
+          </a:xfrm>
+          <a:prstGeom prst="rect">
+            <a:avLst/>
+          </a:prstGeom>
+          <a:noFill/>
+        </p:spPr>
+        <p:txBody>
+          <a:bodyPr wrap="square" rtlCol="0">
+            <a:spAutoFit/>
+          </a:bodyPr>
+          <a:lstStyle/>
+          <a:p>
+            <a:r>
+              <a:rPr lang="ko-KR" altLang="en-US" sz="1500" dirty="0">
+                <a:latin typeface="아임크리수진" panose="00000500000000000000" pitchFamily="2" charset="-127"/>
+                <a:ea typeface="아임크리수진" panose="00000500000000000000" pitchFamily="2" charset="-127"/>
+              </a:rPr>
+              <a:t>로그인</a:t>
+            </a:r>
+            <a:r>
+              <a:rPr lang="en-US" altLang="ko-KR" sz="1500" dirty="0">
+                <a:latin typeface="아임크리수진" panose="00000500000000000000" pitchFamily="2" charset="-127"/>
+                <a:ea typeface="아임크리수진" panose="00000500000000000000" pitchFamily="2" charset="-127"/>
+              </a:rPr>
+              <a:t>/</a:t>
+            </a:r>
+          </a:p>
+          <a:p>
+            <a:r>
+              <a:rPr lang="ko-KR" altLang="en-US" sz="1500" dirty="0">
+                <a:latin typeface="아임크리수진" panose="00000500000000000000" pitchFamily="2" charset="-127"/>
+                <a:ea typeface="아임크리수진" panose="00000500000000000000" pitchFamily="2" charset="-127"/>
+              </a:rPr>
+              <a:t>회원가입</a:t>
+            </a:r>
+          </a:p>
+        </p:txBody>
+      </p:sp>
+      <p:sp>
+        <p:nvSpPr>
+          <p:cNvPr id="20" name="TextBox 19">
+            <a:extLst>
+              <a:ext uri="{FF2B5EF4-FFF2-40B4-BE49-F238E27FC236}">
+                <a16:creationId xmlns:a16="http://schemas.microsoft.com/office/drawing/2014/main" id="{14221B33-91FE-40D2-9616-AAF5423D933B}"/>
+              </a:ext>
+            </a:extLst>
+          </p:cNvPr>
+          <p:cNvSpPr txBox="1"/>
+          <p:nvPr/>
+        </p:nvSpPr>
+        <p:spPr>
+          <a:xfrm>
+            <a:off x="71021" y="177547"/>
+            <a:ext cx="1576804" cy="523220"/>
+          </a:xfrm>
+          <a:prstGeom prst="rect">
+            <a:avLst/>
+          </a:prstGeom>
+          <a:noFill/>
+        </p:spPr>
+        <p:txBody>
+          <a:bodyPr wrap="square" rtlCol="0">
+            <a:spAutoFit/>
+          </a:bodyPr>
+          <a:lstStyle/>
+          <a:p>
+            <a:r>
+              <a:rPr lang="ko-KR" altLang="en-US" sz="2800" dirty="0">
+                <a:latin typeface="아임크리수진" panose="00000500000000000000" pitchFamily="2" charset="-127"/>
+                <a:ea typeface="아임크리수진" panose="00000500000000000000" pitchFamily="2" charset="-127"/>
+              </a:rPr>
+              <a:t>우 학 동</a:t>
+            </a:r>
+          </a:p>
+        </p:txBody>
+      </p:sp>
+      <p:graphicFrame>
+        <p:nvGraphicFramePr>
+          <p:cNvPr id="6" name="표 7">
+            <a:extLst>
+              <a:ext uri="{FF2B5EF4-FFF2-40B4-BE49-F238E27FC236}">
+                <a16:creationId xmlns:a16="http://schemas.microsoft.com/office/drawing/2014/main" id="{3DE114C1-05CE-41C3-AB2D-9756A470720A}"/>
+              </a:ext>
+            </a:extLst>
+          </p:cNvPr>
+          <p:cNvGraphicFramePr>
+            <a:graphicFrameLocks noGrp="1"/>
+          </p:cNvGraphicFramePr>
+          <p:nvPr>
+            <p:extLst>
+              <p:ext uri="{D42A27DB-BD31-4B8C-83A1-F6EECF244321}">
+                <p14:modId xmlns:p14="http://schemas.microsoft.com/office/powerpoint/2010/main" val="2274275926"/>
+              </p:ext>
+            </p:extLst>
+          </p:nvPr>
+        </p:nvGraphicFramePr>
+        <p:xfrm>
+          <a:off x="-1" y="825622"/>
+          <a:ext cx="12192000" cy="621433"/>
+        </p:xfrm>
+        <a:graphic>
+          <a:graphicData uri="http://schemas.openxmlformats.org/drawingml/2006/table">
+            <a:tbl>
+              <a:tblPr firstRow="1" bandRow="1">
+                <a:tableStyleId>{8A107856-5554-42FB-B03E-39F5DBC370BA}</a:tableStyleId>
+              </a:tblPr>
+              <a:tblGrid>
+                <a:gridCol w="6096000">
+                  <a:extLst>
+                    <a:ext uri="{9D8B030D-6E8A-4147-A177-3AD203B41FA5}">
+                      <a16:colId xmlns:a16="http://schemas.microsoft.com/office/drawing/2014/main" val="1099593710"/>
+                    </a:ext>
+                  </a:extLst>
+                </a:gridCol>
+                <a:gridCol w="6096000">
+                  <a:extLst>
+                    <a:ext uri="{9D8B030D-6E8A-4147-A177-3AD203B41FA5}">
+                      <a16:colId xmlns:a16="http://schemas.microsoft.com/office/drawing/2014/main" val="1769272307"/>
+                    </a:ext>
+                  </a:extLst>
+                </a:gridCol>
+              </a:tblGrid>
+              <a:tr h="621433">
+                <a:tc>
+                  <a:txBody>
+                    <a:bodyPr/>
+                    <a:lstStyle/>
+                    <a:p>
+                      <a:pPr algn="ctr" latinLnBrk="1"/>
+                      <a:endParaRPr lang="en-US" altLang="ko-KR" sz="800" dirty="0"/>
+                    </a:p>
+                    <a:p>
+                      <a:pPr algn="ctr" latinLnBrk="1"/>
+                      <a:r>
+                        <a:rPr lang="ko-KR" altLang="en-US" dirty="0"/>
+                        <a:t>중앙동아리</a:t>
+                      </a:r>
+                    </a:p>
+                  </a:txBody>
+                  <a:tcPr>
+                    <a:solidFill>
+                      <a:schemeClr val="accent2"/>
+                    </a:solidFill>
+                  </a:tcPr>
+                </a:tc>
+                <a:tc>
+                  <a:txBody>
+                    <a:bodyPr/>
+                    <a:lstStyle/>
+                    <a:p>
+                      <a:pPr algn="ctr" latinLnBrk="1"/>
+                      <a:endParaRPr lang="en-US" altLang="ko-KR" sz="800" dirty="0"/>
+                    </a:p>
+                    <a:p>
+                      <a:pPr algn="ctr" latinLnBrk="1"/>
+                      <a:r>
+                        <a:rPr lang="ko-KR" altLang="en-US" dirty="0"/>
+                        <a:t>과동아리</a:t>
+                      </a:r>
+                    </a:p>
+                  </a:txBody>
+                  <a:tcPr/>
+                </a:tc>
+                <a:extLst>
+                  <a:ext uri="{0D108BD9-81ED-4DB2-BD59-A6C34878D82A}">
+                    <a16:rowId xmlns:a16="http://schemas.microsoft.com/office/drawing/2014/main" val="3495335735"/>
+                  </a:ext>
+                </a:extLst>
+              </a:tr>
+            </a:tbl>
+          </a:graphicData>
+        </a:graphic>
+      </p:graphicFrame>
+      <p:sp>
+        <p:nvSpPr>
+          <p:cNvPr id="8" name="직사각형 7">
+            <a:extLst>
+              <a:ext uri="{FF2B5EF4-FFF2-40B4-BE49-F238E27FC236}">
+                <a16:creationId xmlns:a16="http://schemas.microsoft.com/office/drawing/2014/main" id="{50399466-27B2-46D6-AA12-7C479F7E1301}"/>
+              </a:ext>
+            </a:extLst>
+          </p:cNvPr>
+          <p:cNvSpPr/>
+          <p:nvPr/>
+        </p:nvSpPr>
+        <p:spPr>
+          <a:xfrm>
+            <a:off x="523872" y="2361460"/>
+            <a:ext cx="3268800" cy="2902998"/>
+          </a:xfrm>
+          <a:prstGeom prst="rect">
+            <a:avLst/>
+          </a:prstGeom>
+          <a:ln>
+            <a:noFill/>
+          </a:ln>
+        </p:spPr>
+        <p:style>
+          <a:lnRef idx="2">
+            <a:schemeClr val="dk1">
+              <a:shade val="50000"/>
+            </a:schemeClr>
+          </a:lnRef>
+          <a:fillRef idx="1">
+            <a:schemeClr val="dk1"/>
+          </a:fillRef>
+          <a:effectRef idx="0">
+            <a:schemeClr val="dk1"/>
+          </a:effectRef>
+          <a:fontRef idx="minor">
+            <a:schemeClr val="lt1"/>
+          </a:fontRef>
+        </p:style>
+        <p:txBody>
+          <a:bodyPr rtlCol="0" anchor="ctr"/>
+          <a:lstStyle/>
+          <a:p>
+            <a:pPr algn="ctr"/>
+            <a:r>
+              <a:rPr lang="en-US" altLang="ko-KR" dirty="0"/>
+              <a:t>A</a:t>
+            </a:r>
+            <a:r>
+              <a:rPr lang="ko-KR" altLang="en-US" dirty="0"/>
+              <a:t>동아리</a:t>
+            </a:r>
+          </a:p>
+        </p:txBody>
+      </p:sp>
+      <p:sp>
+        <p:nvSpPr>
+          <p:cNvPr id="14" name="직사각형 13">
+            <a:extLst>
+              <a:ext uri="{FF2B5EF4-FFF2-40B4-BE49-F238E27FC236}">
+                <a16:creationId xmlns:a16="http://schemas.microsoft.com/office/drawing/2014/main" id="{AB290F36-45FF-402F-A850-1981AB82DD52}"/>
+              </a:ext>
+            </a:extLst>
+          </p:cNvPr>
+          <p:cNvSpPr/>
+          <p:nvPr/>
+        </p:nvSpPr>
+        <p:spPr>
+          <a:xfrm>
+            <a:off x="4461599" y="2361460"/>
+            <a:ext cx="3268800" cy="2902998"/>
+          </a:xfrm>
+          <a:prstGeom prst="rect">
+            <a:avLst/>
+          </a:prstGeom>
+          <a:ln>
+            <a:noFill/>
+          </a:ln>
+        </p:spPr>
+        <p:style>
+          <a:lnRef idx="3">
+            <a:schemeClr val="lt1"/>
+          </a:lnRef>
+          <a:fillRef idx="1">
+            <a:schemeClr val="accent6"/>
+          </a:fillRef>
+          <a:effectRef idx="1">
+            <a:schemeClr val="accent6"/>
+          </a:effectRef>
+          <a:fontRef idx="minor">
+            <a:schemeClr val="lt1"/>
+          </a:fontRef>
+        </p:style>
+        <p:txBody>
+          <a:bodyPr rtlCol="0" anchor="ctr"/>
+          <a:lstStyle/>
+          <a:p>
+            <a:pPr algn="ctr"/>
+            <a:r>
+              <a:rPr lang="en-US" altLang="ko-KR" dirty="0"/>
+              <a:t>B</a:t>
+            </a:r>
+            <a:r>
+              <a:rPr lang="ko-KR" altLang="en-US" dirty="0"/>
+              <a:t>동아리</a:t>
+            </a:r>
+          </a:p>
+        </p:txBody>
+      </p:sp>
+      <p:sp>
+        <p:nvSpPr>
+          <p:cNvPr id="17" name="직사각형 16">
+            <a:extLst>
+              <a:ext uri="{FF2B5EF4-FFF2-40B4-BE49-F238E27FC236}">
+                <a16:creationId xmlns:a16="http://schemas.microsoft.com/office/drawing/2014/main" id="{BC1AD28C-0FBC-4BA0-BD98-772EB59FB723}"/>
+              </a:ext>
+            </a:extLst>
+          </p:cNvPr>
+          <p:cNvSpPr/>
+          <p:nvPr/>
+        </p:nvSpPr>
+        <p:spPr>
+          <a:xfrm>
+            <a:off x="8399326" y="2361460"/>
+            <a:ext cx="3268800" cy="2902998"/>
+          </a:xfrm>
+          <a:prstGeom prst="rect">
+            <a:avLst/>
+          </a:prstGeom>
+          <a:ln>
+            <a:noFill/>
+          </a:ln>
+        </p:spPr>
+        <p:style>
+          <a:lnRef idx="2">
+            <a:schemeClr val="accent4">
+              <a:shade val="50000"/>
+            </a:schemeClr>
+          </a:lnRef>
+          <a:fillRef idx="1">
+            <a:schemeClr val="accent4"/>
+          </a:fillRef>
+          <a:effectRef idx="0">
+            <a:schemeClr val="accent4"/>
+          </a:effectRef>
+          <a:fontRef idx="minor">
+            <a:schemeClr val="lt1"/>
+          </a:fontRef>
+        </p:style>
+        <p:txBody>
+          <a:bodyPr rtlCol="0" anchor="ctr"/>
+          <a:lstStyle/>
+          <a:p>
+            <a:pPr algn="ctr"/>
+            <a:r>
+              <a:rPr lang="en-US" altLang="ko-KR" dirty="0"/>
+              <a:t>C</a:t>
+            </a:r>
+            <a:r>
+              <a:rPr lang="ko-KR" altLang="en-US" dirty="0"/>
+              <a:t>동아리</a:t>
+            </a:r>
+          </a:p>
+        </p:txBody>
+      </p:sp>
+      <p:pic>
+        <p:nvPicPr>
+          <p:cNvPr id="11" name="그림 10">
+            <a:extLst>
+              <a:ext uri="{FF2B5EF4-FFF2-40B4-BE49-F238E27FC236}">
+                <a16:creationId xmlns:a16="http://schemas.microsoft.com/office/drawing/2014/main" id="{44144903-6725-43B9-8FE8-BCB35E8FB727}"/>
+              </a:ext>
+            </a:extLst>
+          </p:cNvPr>
+          <p:cNvPicPr>
+            <a:picLocks noChangeAspect="1"/>
+          </p:cNvPicPr>
+          <p:nvPr/>
+        </p:nvPicPr>
+        <p:blipFill>
+          <a:blip r:embed="rId2">
+            <a:extLst>
+              <a:ext uri="{BEBA8EAE-BF5A-486C-A8C5-ECC9F3942E4B}">
+                <a14:imgProps xmlns:a14="http://schemas.microsoft.com/office/drawing/2010/main">
+                  <a14:imgLayer r:embed="rId3">
+                    <a14:imgEffect>
+                      <a14:backgroundRemoval t="10000" b="90000" l="10000" r="90000"/>
+                    </a14:imgEffect>
+                  </a14:imgLayer>
+                </a14:imgProps>
+              </a:ext>
+            </a:extLst>
+          </a:blip>
+          <a:stretch>
+            <a:fillRect/>
+          </a:stretch>
+        </p:blipFill>
+        <p:spPr>
+          <a:xfrm>
+            <a:off x="3684323" y="884188"/>
+            <a:ext cx="497724" cy="479386"/>
+          </a:xfrm>
+          <a:prstGeom prst="rect">
+            <a:avLst/>
+          </a:prstGeom>
+        </p:spPr>
+      </p:pic>
+      <p:sp>
+        <p:nvSpPr>
+          <p:cNvPr id="21" name="직사각형 20">
+            <a:extLst>
+              <a:ext uri="{FF2B5EF4-FFF2-40B4-BE49-F238E27FC236}">
+                <a16:creationId xmlns:a16="http://schemas.microsoft.com/office/drawing/2014/main" id="{7A4EBE4D-C220-4B8C-B676-78A138DD6F63}"/>
+              </a:ext>
+            </a:extLst>
+          </p:cNvPr>
+          <p:cNvSpPr/>
+          <p:nvPr/>
+        </p:nvSpPr>
+        <p:spPr>
+          <a:xfrm>
+            <a:off x="523871" y="5771410"/>
+            <a:ext cx="3268799" cy="2902998"/>
+          </a:xfrm>
+          <a:prstGeom prst="rect">
+            <a:avLst/>
+          </a:prstGeom>
+          <a:solidFill>
+            <a:schemeClr val="accent6">
+              <a:lumMod val="50000"/>
+            </a:schemeClr>
+          </a:solidFill>
+          <a:ln>
+            <a:noFill/>
+          </a:ln>
+        </p:spPr>
+        <p:style>
+          <a:lnRef idx="2">
+            <a:schemeClr val="dk1">
+              <a:shade val="50000"/>
+            </a:schemeClr>
+          </a:lnRef>
+          <a:fillRef idx="1">
+            <a:schemeClr val="dk1"/>
+          </a:fillRef>
+          <a:effectRef idx="0">
+            <a:schemeClr val="dk1"/>
+          </a:effectRef>
+          <a:fontRef idx="minor">
+            <a:schemeClr val="lt1"/>
+          </a:fontRef>
+        </p:style>
+        <p:txBody>
+          <a:bodyPr rtlCol="0" anchor="ctr"/>
+          <a:lstStyle/>
+          <a:p>
+            <a:pPr algn="ctr"/>
+            <a:r>
+              <a:rPr lang="en-US" altLang="ko-KR" dirty="0"/>
+              <a:t>D</a:t>
+            </a:r>
+            <a:r>
+              <a:rPr lang="ko-KR" altLang="en-US" dirty="0"/>
+              <a:t>동아리</a:t>
+            </a:r>
+          </a:p>
+        </p:txBody>
+      </p:sp>
+      <p:sp>
+        <p:nvSpPr>
+          <p:cNvPr id="22" name="직사각형 21">
+            <a:extLst>
+              <a:ext uri="{FF2B5EF4-FFF2-40B4-BE49-F238E27FC236}">
+                <a16:creationId xmlns:a16="http://schemas.microsoft.com/office/drawing/2014/main" id="{FD2A1119-22B8-4A80-9BEA-7B77C7FE113E}"/>
+              </a:ext>
+            </a:extLst>
+          </p:cNvPr>
+          <p:cNvSpPr/>
+          <p:nvPr/>
+        </p:nvSpPr>
+        <p:spPr>
+          <a:xfrm>
+            <a:off x="4461598" y="5771410"/>
+            <a:ext cx="3268799" cy="2902998"/>
+          </a:xfrm>
+          <a:prstGeom prst="rect">
+            <a:avLst/>
+          </a:prstGeom>
+          <a:solidFill>
+            <a:schemeClr val="accent5">
+              <a:lumMod val="50000"/>
+            </a:schemeClr>
+          </a:solidFill>
+          <a:ln>
+            <a:noFill/>
+          </a:ln>
+        </p:spPr>
+        <p:style>
+          <a:lnRef idx="3">
+            <a:schemeClr val="lt1"/>
+          </a:lnRef>
+          <a:fillRef idx="1">
+            <a:schemeClr val="accent6"/>
+          </a:fillRef>
+          <a:effectRef idx="1">
+            <a:schemeClr val="accent6"/>
+          </a:effectRef>
+          <a:fontRef idx="minor">
+            <a:schemeClr val="lt1"/>
+          </a:fontRef>
+        </p:style>
+        <p:txBody>
+          <a:bodyPr rtlCol="0" anchor="ctr"/>
+          <a:lstStyle/>
+          <a:p>
+            <a:pPr algn="ctr"/>
+            <a:r>
+              <a:rPr lang="en-US" altLang="ko-KR" dirty="0"/>
+              <a:t>E</a:t>
+            </a:r>
+            <a:r>
+              <a:rPr lang="ko-KR" altLang="en-US" dirty="0"/>
+              <a:t>동아리</a:t>
+            </a:r>
+          </a:p>
+        </p:txBody>
+      </p:sp>
+      <p:sp>
+        <p:nvSpPr>
+          <p:cNvPr id="23" name="직사각형 22">
+            <a:extLst>
+              <a:ext uri="{FF2B5EF4-FFF2-40B4-BE49-F238E27FC236}">
+                <a16:creationId xmlns:a16="http://schemas.microsoft.com/office/drawing/2014/main" id="{4A1A132B-9022-4A4D-96CE-E71B7B500D5F}"/>
+              </a:ext>
+            </a:extLst>
+          </p:cNvPr>
+          <p:cNvSpPr/>
+          <p:nvPr/>
+        </p:nvSpPr>
+        <p:spPr>
+          <a:xfrm>
+            <a:off x="8399325" y="5771410"/>
+            <a:ext cx="3268799" cy="2902998"/>
+          </a:xfrm>
+          <a:prstGeom prst="rect">
+            <a:avLst/>
+          </a:prstGeom>
+          <a:solidFill>
+            <a:schemeClr val="accent4">
+              <a:lumMod val="50000"/>
+            </a:schemeClr>
+          </a:solidFill>
+          <a:ln>
+            <a:noFill/>
+          </a:ln>
+        </p:spPr>
+        <p:style>
+          <a:lnRef idx="2">
+            <a:schemeClr val="accent4">
+              <a:shade val="50000"/>
+            </a:schemeClr>
+          </a:lnRef>
+          <a:fillRef idx="1">
+            <a:schemeClr val="accent4"/>
+          </a:fillRef>
+          <a:effectRef idx="0">
+            <a:schemeClr val="accent4"/>
+          </a:effectRef>
+          <a:fontRef idx="minor">
+            <a:schemeClr val="lt1"/>
+          </a:fontRef>
+        </p:style>
+        <p:txBody>
+          <a:bodyPr rtlCol="0" anchor="ctr"/>
+          <a:lstStyle/>
+          <a:p>
+            <a:pPr algn="ctr"/>
+            <a:r>
+              <a:rPr lang="en-US" altLang="ko-KR" dirty="0"/>
+              <a:t>F</a:t>
+            </a:r>
+            <a:r>
+              <a:rPr lang="ko-KR" altLang="en-US" dirty="0"/>
+              <a:t>동아리</a:t>
+            </a:r>
+          </a:p>
+        </p:txBody>
+      </p:sp>
+      <p:cxnSp>
+        <p:nvCxnSpPr>
+          <p:cNvPr id="24" name="직선 연결선 23">
+            <a:extLst>
+              <a:ext uri="{FF2B5EF4-FFF2-40B4-BE49-F238E27FC236}">
+                <a16:creationId xmlns:a16="http://schemas.microsoft.com/office/drawing/2014/main" id="{B9FF5D75-F216-40BA-8CCE-951B57886F2E}"/>
+              </a:ext>
+            </a:extLst>
+          </p:cNvPr>
+          <p:cNvCxnSpPr>
+            <a:cxnSpLocks/>
+          </p:cNvCxnSpPr>
+          <p:nvPr/>
+        </p:nvCxnSpPr>
+        <p:spPr>
+          <a:xfrm>
+            <a:off x="-1" y="825622"/>
+            <a:ext cx="12192000" cy="0"/>
+          </a:xfrm>
+          <a:prstGeom prst="line">
+            <a:avLst/>
+          </a:prstGeom>
+          <a:ln w="19050">
+            <a:solidFill>
+              <a:srgbClr val="8B8A86"/>
+            </a:solidFill>
+          </a:ln>
+        </p:spPr>
+        <p:style>
+          <a:lnRef idx="1">
+            <a:schemeClr val="accent1"/>
+          </a:lnRef>
+          <a:fillRef idx="0">
+            <a:schemeClr val="accent1"/>
+          </a:fillRef>
+          <a:effectRef idx="0">
+            <a:schemeClr val="accent1"/>
+          </a:effectRef>
+          <a:fontRef idx="minor">
+            <a:schemeClr val="tx1"/>
+          </a:fontRef>
+        </p:style>
+      </p:cxnSp>
+    </p:spTree>
+    <p:extLst>
+      <p:ext uri="{BB962C8B-B14F-4D97-AF65-F5344CB8AC3E}">
+        <p14:creationId xmlns:p14="http://schemas.microsoft.com/office/powerpoint/2010/main" val="517264299"/>
+      </p:ext>
+    </p:extLst>
+  </p:cSld>
+  <p:clrMapOvr>
+    <a:masterClrMapping/>
+  </p:clrMapOvr>
+</p:sld>
+</file>
+
+<file path=ppt/slides/slide6.xml><?xml version="1.0" encoding="utf-8"?>
+<p:sld xmlns:a="http://schemas.openxmlformats.org/drawingml/2006/main" xmlns:r="http://schemas.openxmlformats.org/officeDocument/2006/relationships" xmlns:p="http://schemas.openxmlformats.org/presentationml/2006/main">
+  <p:cSld>
+    <p:spTree>
+      <p:nvGrpSpPr>
+        <p:cNvPr id="1" name=""/>
+        <p:cNvGrpSpPr/>
+        <p:nvPr/>
+      </p:nvGrpSpPr>
+      <p:grpSpPr>
+        <a:xfrm>
+          <a:off x="0" y="0"/>
+          <a:ext cx="0" cy="0"/>
+          <a:chOff x="0" y="0"/>
+          <a:chExt cx="0" cy="0"/>
+        </a:xfrm>
+      </p:grpSpPr>
+      <p:sp>
+        <p:nvSpPr>
+          <p:cNvPr id="21" name="직사각형 20">
+            <a:extLst>
+              <a:ext uri="{FF2B5EF4-FFF2-40B4-BE49-F238E27FC236}">
+                <a16:creationId xmlns:a16="http://schemas.microsoft.com/office/drawing/2014/main" id="{424469CE-01DD-4458-9202-21D2F33AB13F}"/>
+              </a:ext>
+            </a:extLst>
+          </p:cNvPr>
+          <p:cNvSpPr/>
+          <p:nvPr/>
+        </p:nvSpPr>
+        <p:spPr>
+          <a:xfrm>
+            <a:off x="4591334" y="5649149"/>
+            <a:ext cx="3000378" cy="2696316"/>
+          </a:xfrm>
+          <a:prstGeom prst="rect">
+            <a:avLst/>
+          </a:prstGeom>
+          <a:solidFill>
+            <a:schemeClr val="accent1">
+              <a:lumMod val="50000"/>
+              <a:alpha val="50000"/>
+            </a:schemeClr>
+          </a:solidFill>
+          <a:ln>
+            <a:noFill/>
+          </a:ln>
+        </p:spPr>
+        <p:style>
+          <a:lnRef idx="2">
+            <a:schemeClr val="dk1">
+              <a:shade val="50000"/>
+            </a:schemeClr>
+          </a:lnRef>
+          <a:fillRef idx="1">
+            <a:schemeClr val="dk1"/>
+          </a:fillRef>
+          <a:effectRef idx="0">
+            <a:schemeClr val="dk1"/>
+          </a:effectRef>
+          <a:fontRef idx="minor">
+            <a:schemeClr val="lt1"/>
+          </a:fontRef>
+        </p:style>
+        <p:txBody>
+          <a:bodyPr rtlCol="0" anchor="ctr"/>
+          <a:lstStyle/>
+          <a:p>
+            <a:pPr algn="ctr"/>
+            <a:r>
+              <a:rPr lang="en-US" altLang="ko-KR" dirty="0"/>
+              <a:t>E</a:t>
+            </a:r>
+            <a:r>
+              <a:rPr lang="ko-KR" altLang="en-US" dirty="0"/>
+              <a:t>동아리</a:t>
+            </a:r>
+          </a:p>
+        </p:txBody>
+      </p:sp>
+      <p:cxnSp>
+        <p:nvCxnSpPr>
+          <p:cNvPr id="5" name="직선 연결선 4">
+            <a:extLst>
+              <a:ext uri="{FF2B5EF4-FFF2-40B4-BE49-F238E27FC236}">
+                <a16:creationId xmlns:a16="http://schemas.microsoft.com/office/drawing/2014/main" id="{1325E981-3FF4-4A21-8ECF-B07056121B5C}"/>
+              </a:ext>
+            </a:extLst>
+          </p:cNvPr>
+          <p:cNvCxnSpPr>
+            <a:cxnSpLocks/>
+          </p:cNvCxnSpPr>
+          <p:nvPr/>
+        </p:nvCxnSpPr>
+        <p:spPr>
+          <a:xfrm>
+            <a:off x="0" y="825623"/>
+            <a:ext cx="12192000" cy="0"/>
+          </a:xfrm>
+          <a:prstGeom prst="line">
+            <a:avLst/>
+          </a:prstGeom>
+          <a:ln w="19050">
+            <a:solidFill>
+              <a:srgbClr val="8B8A86"/>
+            </a:solidFill>
+          </a:ln>
+        </p:spPr>
+        <p:style>
+          <a:lnRef idx="1">
+            <a:schemeClr val="accent1"/>
+          </a:lnRef>
+          <a:fillRef idx="0">
+            <a:schemeClr val="accent1"/>
+          </a:fillRef>
+          <a:effectRef idx="0">
+            <a:schemeClr val="accent1"/>
+          </a:effectRef>
+          <a:fontRef idx="minor">
+            <a:schemeClr val="tx1"/>
+          </a:fontRef>
+        </p:style>
+      </p:cxnSp>
+      <p:sp>
+        <p:nvSpPr>
+          <p:cNvPr id="7" name="TextBox 6">
+            <a:extLst>
+              <a:ext uri="{FF2B5EF4-FFF2-40B4-BE49-F238E27FC236}">
+                <a16:creationId xmlns:a16="http://schemas.microsoft.com/office/drawing/2014/main" id="{9DAB59B5-5CB9-4E0A-9118-4E8C123D32AD}"/>
+              </a:ext>
+            </a:extLst>
+          </p:cNvPr>
+          <p:cNvSpPr txBox="1"/>
+          <p:nvPr/>
+        </p:nvSpPr>
+        <p:spPr>
+          <a:xfrm>
+            <a:off x="11144251" y="177547"/>
+            <a:ext cx="1047750" cy="553998"/>
+          </a:xfrm>
+          <a:prstGeom prst="rect">
+            <a:avLst/>
+          </a:prstGeom>
+          <a:noFill/>
+        </p:spPr>
+        <p:txBody>
+          <a:bodyPr wrap="square" rtlCol="0">
+            <a:spAutoFit/>
+          </a:bodyPr>
+          <a:lstStyle/>
+          <a:p>
+            <a:r>
+              <a:rPr lang="ko-KR" altLang="en-US" sz="1500" dirty="0">
+                <a:latin typeface="아임크리수진" panose="00000500000000000000" pitchFamily="2" charset="-127"/>
+                <a:ea typeface="아임크리수진" panose="00000500000000000000" pitchFamily="2" charset="-127"/>
+              </a:rPr>
+              <a:t>로그인</a:t>
+            </a:r>
+            <a:r>
+              <a:rPr lang="en-US" altLang="ko-KR" sz="1500" dirty="0">
+                <a:latin typeface="아임크리수진" panose="00000500000000000000" pitchFamily="2" charset="-127"/>
+                <a:ea typeface="아임크리수진" panose="00000500000000000000" pitchFamily="2" charset="-127"/>
+              </a:rPr>
+              <a:t>/</a:t>
+            </a:r>
+          </a:p>
+          <a:p>
+            <a:r>
+              <a:rPr lang="ko-KR" altLang="en-US" sz="1500" dirty="0">
+                <a:latin typeface="아임크리수진" panose="00000500000000000000" pitchFamily="2" charset="-127"/>
+                <a:ea typeface="아임크리수진" panose="00000500000000000000" pitchFamily="2" charset="-127"/>
+              </a:rPr>
+              <a:t>회원가입</a:t>
+            </a:r>
+          </a:p>
+        </p:txBody>
+      </p:sp>
+      <p:sp>
+        <p:nvSpPr>
+          <p:cNvPr id="20" name="TextBox 19">
+            <a:extLst>
+              <a:ext uri="{FF2B5EF4-FFF2-40B4-BE49-F238E27FC236}">
+                <a16:creationId xmlns:a16="http://schemas.microsoft.com/office/drawing/2014/main" id="{14221B33-91FE-40D2-9616-AAF5423D933B}"/>
+              </a:ext>
+            </a:extLst>
+          </p:cNvPr>
+          <p:cNvSpPr txBox="1"/>
+          <p:nvPr/>
+        </p:nvSpPr>
+        <p:spPr>
+          <a:xfrm>
+            <a:off x="71021" y="177547"/>
+            <a:ext cx="1576804" cy="523220"/>
+          </a:xfrm>
+          <a:prstGeom prst="rect">
+            <a:avLst/>
+          </a:prstGeom>
+          <a:noFill/>
+        </p:spPr>
+        <p:txBody>
+          <a:bodyPr wrap="square" rtlCol="0">
+            <a:spAutoFit/>
+          </a:bodyPr>
+          <a:lstStyle/>
+          <a:p>
+            <a:r>
+              <a:rPr lang="ko-KR" altLang="en-US" sz="2800" dirty="0">
+                <a:latin typeface="아임크리수진" panose="00000500000000000000" pitchFamily="2" charset="-127"/>
+                <a:ea typeface="아임크리수진" panose="00000500000000000000" pitchFamily="2" charset="-127"/>
+              </a:rPr>
+              <a:t>우 학 동</a:t>
+            </a:r>
+          </a:p>
+        </p:txBody>
+      </p:sp>
+      <p:graphicFrame>
+        <p:nvGraphicFramePr>
+          <p:cNvPr id="6" name="표 7">
+            <a:extLst>
+              <a:ext uri="{FF2B5EF4-FFF2-40B4-BE49-F238E27FC236}">
+                <a16:creationId xmlns:a16="http://schemas.microsoft.com/office/drawing/2014/main" id="{3DE114C1-05CE-41C3-AB2D-9756A470720A}"/>
+              </a:ext>
+            </a:extLst>
+          </p:cNvPr>
+          <p:cNvGraphicFramePr>
+            <a:graphicFrameLocks noGrp="1"/>
+          </p:cNvGraphicFramePr>
+          <p:nvPr/>
+        </p:nvGraphicFramePr>
+        <p:xfrm>
+          <a:off x="-1" y="825622"/>
+          <a:ext cx="12192000" cy="621433"/>
+        </p:xfrm>
+        <a:graphic>
+          <a:graphicData uri="http://schemas.openxmlformats.org/drawingml/2006/table">
+            <a:tbl>
+              <a:tblPr firstRow="1" bandRow="1">
+                <a:tableStyleId>{8A107856-5554-42FB-B03E-39F5DBC370BA}</a:tableStyleId>
+              </a:tblPr>
+              <a:tblGrid>
+                <a:gridCol w="6096000">
+                  <a:extLst>
+                    <a:ext uri="{9D8B030D-6E8A-4147-A177-3AD203B41FA5}">
+                      <a16:colId xmlns:a16="http://schemas.microsoft.com/office/drawing/2014/main" val="1099593710"/>
+                    </a:ext>
+                  </a:extLst>
+                </a:gridCol>
+                <a:gridCol w="6096000">
+                  <a:extLst>
+                    <a:ext uri="{9D8B030D-6E8A-4147-A177-3AD203B41FA5}">
+                      <a16:colId xmlns:a16="http://schemas.microsoft.com/office/drawing/2014/main" val="1769272307"/>
+                    </a:ext>
+                  </a:extLst>
+                </a:gridCol>
+              </a:tblGrid>
+              <a:tr h="621433">
+                <a:tc>
+                  <a:txBody>
+                    <a:bodyPr/>
+                    <a:lstStyle/>
+                    <a:p>
+                      <a:pPr algn="ctr" latinLnBrk="1"/>
+                      <a:endParaRPr lang="en-US" altLang="ko-KR" sz="800" dirty="0"/>
+                    </a:p>
+                    <a:p>
+                      <a:pPr algn="ctr" latinLnBrk="1"/>
+                      <a:r>
+                        <a:rPr lang="ko-KR" altLang="en-US" dirty="0"/>
+                        <a:t>중앙동아리</a:t>
+                      </a:r>
+                    </a:p>
+                  </a:txBody>
+                  <a:tcPr>
+                    <a:solidFill>
+                      <a:schemeClr val="accent2"/>
+                    </a:solidFill>
+                  </a:tcPr>
+                </a:tc>
+                <a:tc>
+                  <a:txBody>
+                    <a:bodyPr/>
+                    <a:lstStyle/>
+                    <a:p>
+                      <a:pPr algn="ctr" latinLnBrk="1"/>
+                      <a:endParaRPr lang="en-US" altLang="ko-KR" sz="800" dirty="0"/>
+                    </a:p>
+                    <a:p>
+                      <a:pPr algn="ctr" latinLnBrk="1"/>
+                      <a:r>
+                        <a:rPr lang="ko-KR" altLang="en-US" dirty="0"/>
+                        <a:t>과동아리</a:t>
+                      </a:r>
+                    </a:p>
+                  </a:txBody>
+                  <a:tcPr/>
+                </a:tc>
+                <a:extLst>
+                  <a:ext uri="{0D108BD9-81ED-4DB2-BD59-A6C34878D82A}">
+                    <a16:rowId xmlns:a16="http://schemas.microsoft.com/office/drawing/2014/main" val="3495335735"/>
+                  </a:ext>
+                </a:extLst>
+              </a:tr>
+            </a:tbl>
+          </a:graphicData>
+        </a:graphic>
+      </p:graphicFrame>
+      <p:sp>
+        <p:nvSpPr>
+          <p:cNvPr id="8" name="직사각형 7">
+            <a:extLst>
+              <a:ext uri="{FF2B5EF4-FFF2-40B4-BE49-F238E27FC236}">
+                <a16:creationId xmlns:a16="http://schemas.microsoft.com/office/drawing/2014/main" id="{50399466-27B2-46D6-AA12-7C479F7E1301}"/>
+              </a:ext>
+            </a:extLst>
+          </p:cNvPr>
+          <p:cNvSpPr/>
+          <p:nvPr/>
+        </p:nvSpPr>
+        <p:spPr>
+          <a:xfrm>
+            <a:off x="523872" y="2361460"/>
+            <a:ext cx="3000378" cy="2696316"/>
+          </a:xfrm>
+          <a:prstGeom prst="rect">
+            <a:avLst/>
+          </a:prstGeom>
+          <a:solidFill>
+            <a:schemeClr val="dk1">
+              <a:alpha val="50000"/>
+            </a:schemeClr>
+          </a:solidFill>
+          <a:ln>
+            <a:noFill/>
+          </a:ln>
+        </p:spPr>
+        <p:style>
+          <a:lnRef idx="2">
+            <a:schemeClr val="dk1">
+              <a:shade val="50000"/>
+            </a:schemeClr>
+          </a:lnRef>
+          <a:fillRef idx="1">
+            <a:schemeClr val="dk1"/>
+          </a:fillRef>
+          <a:effectRef idx="0">
+            <a:schemeClr val="dk1"/>
+          </a:effectRef>
+          <a:fontRef idx="minor">
+            <a:schemeClr val="lt1"/>
+          </a:fontRef>
+        </p:style>
+        <p:txBody>
+          <a:bodyPr rtlCol="0" anchor="ctr"/>
+          <a:lstStyle/>
+          <a:p>
+            <a:pPr algn="ctr"/>
+            <a:r>
+              <a:rPr lang="en-US" altLang="ko-KR" dirty="0"/>
+              <a:t>A</a:t>
+            </a:r>
+            <a:r>
+              <a:rPr lang="ko-KR" altLang="en-US" dirty="0"/>
+              <a:t>동아리</a:t>
+            </a:r>
+          </a:p>
+        </p:txBody>
+      </p:sp>
+      <p:sp>
+        <p:nvSpPr>
+          <p:cNvPr id="17" name="직사각형 16">
+            <a:extLst>
+              <a:ext uri="{FF2B5EF4-FFF2-40B4-BE49-F238E27FC236}">
+                <a16:creationId xmlns:a16="http://schemas.microsoft.com/office/drawing/2014/main" id="{BC1AD28C-0FBC-4BA0-BD98-772EB59FB723}"/>
+              </a:ext>
+            </a:extLst>
+          </p:cNvPr>
+          <p:cNvSpPr/>
+          <p:nvPr/>
+        </p:nvSpPr>
+        <p:spPr>
+          <a:xfrm>
+            <a:off x="8658222" y="2361458"/>
+            <a:ext cx="3000377" cy="2696318"/>
+          </a:xfrm>
+          <a:prstGeom prst="rect">
+            <a:avLst/>
+          </a:prstGeom>
+          <a:solidFill>
+            <a:schemeClr val="accent4">
+              <a:alpha val="50000"/>
+            </a:schemeClr>
+          </a:solidFill>
+          <a:ln>
+            <a:noFill/>
+          </a:ln>
+        </p:spPr>
+        <p:style>
+          <a:lnRef idx="2">
+            <a:schemeClr val="accent4">
+              <a:shade val="50000"/>
+            </a:schemeClr>
+          </a:lnRef>
+          <a:fillRef idx="1">
+            <a:schemeClr val="accent4"/>
+          </a:fillRef>
+          <a:effectRef idx="0">
+            <a:schemeClr val="accent4"/>
+          </a:effectRef>
+          <a:fontRef idx="minor">
+            <a:schemeClr val="lt1"/>
+          </a:fontRef>
+        </p:style>
+        <p:txBody>
+          <a:bodyPr rtlCol="0" anchor="ctr"/>
+          <a:lstStyle/>
+          <a:p>
+            <a:pPr algn="ctr"/>
+            <a:r>
+              <a:rPr lang="en-US" altLang="ko-KR" dirty="0"/>
+              <a:t>C</a:t>
+            </a:r>
+            <a:r>
+              <a:rPr lang="ko-KR" altLang="en-US" dirty="0"/>
+              <a:t>동아리</a:t>
+            </a:r>
+          </a:p>
+        </p:txBody>
+      </p:sp>
+      <p:pic>
+        <p:nvPicPr>
+          <p:cNvPr id="11" name="그림 10">
+            <a:extLst>
+              <a:ext uri="{FF2B5EF4-FFF2-40B4-BE49-F238E27FC236}">
+                <a16:creationId xmlns:a16="http://schemas.microsoft.com/office/drawing/2014/main" id="{44144903-6725-43B9-8FE8-BCB35E8FB727}"/>
+              </a:ext>
+            </a:extLst>
+          </p:cNvPr>
+          <p:cNvPicPr>
+            <a:picLocks noChangeAspect="1"/>
+          </p:cNvPicPr>
+          <p:nvPr/>
+        </p:nvPicPr>
+        <p:blipFill>
+          <a:blip r:embed="rId2">
+            <a:extLst>
+              <a:ext uri="{BEBA8EAE-BF5A-486C-A8C5-ECC9F3942E4B}">
+                <a14:imgProps xmlns:a14="http://schemas.microsoft.com/office/drawing/2010/main">
+                  <a14:imgLayer r:embed="rId3">
+                    <a14:imgEffect>
+                      <a14:backgroundRemoval t="10000" b="90000" l="10000" r="90000"/>
+                    </a14:imgEffect>
+                  </a14:imgLayer>
+                </a14:imgProps>
+              </a:ext>
+            </a:extLst>
+          </a:blip>
+          <a:stretch>
+            <a:fillRect/>
+          </a:stretch>
+        </p:blipFill>
+        <p:spPr>
+          <a:xfrm>
+            <a:off x="3684323" y="884188"/>
+            <a:ext cx="497724" cy="479386"/>
+          </a:xfrm>
+          <a:prstGeom prst="rect">
+            <a:avLst/>
+          </a:prstGeom>
+        </p:spPr>
+      </p:pic>
+      <p:sp>
+        <p:nvSpPr>
+          <p:cNvPr id="12" name="직사각형 11">
+            <a:extLst>
+              <a:ext uri="{FF2B5EF4-FFF2-40B4-BE49-F238E27FC236}">
+                <a16:creationId xmlns:a16="http://schemas.microsoft.com/office/drawing/2014/main" id="{CD2785A2-2694-4B80-A39E-67BECFC4E98F}"/>
+              </a:ext>
+            </a:extLst>
+          </p:cNvPr>
+          <p:cNvSpPr/>
+          <p:nvPr/>
+        </p:nvSpPr>
+        <p:spPr>
+          <a:xfrm>
+            <a:off x="4182046" y="5264456"/>
+            <a:ext cx="3818954" cy="1283737"/>
+          </a:xfrm>
+          <a:prstGeom prst="rect">
+            <a:avLst/>
+          </a:prstGeom>
+          <a:solidFill>
+            <a:schemeClr val="bg1"/>
+          </a:solidFill>
+          <a:ln>
+            <a:solidFill>
+              <a:schemeClr val="accent6">
+                <a:lumMod val="50000"/>
+              </a:schemeClr>
+            </a:solidFill>
+          </a:ln>
+        </p:spPr>
+        <p:style>
+          <a:lnRef idx="3">
+            <a:schemeClr val="lt1"/>
+          </a:lnRef>
+          <a:fillRef idx="1">
+            <a:schemeClr val="accent6"/>
+          </a:fillRef>
+          <a:effectRef idx="1">
+            <a:schemeClr val="accent6"/>
+          </a:effectRef>
+          <a:fontRef idx="minor">
+            <a:schemeClr val="lt1"/>
+          </a:fontRef>
+        </p:style>
+        <p:txBody>
+          <a:bodyPr rtlCol="0" anchor="ctr"/>
+          <a:lstStyle/>
+          <a:p>
+            <a:pPr algn="ctr"/>
+            <a:r>
+              <a:rPr lang="ko-KR" altLang="en-US" dirty="0">
+                <a:solidFill>
+                  <a:schemeClr val="tx1"/>
+                </a:solidFill>
+              </a:rPr>
+              <a:t>음치여도 좋아</a:t>
+            </a:r>
+            <a:r>
+              <a:rPr lang="en-US" altLang="ko-KR" dirty="0">
+                <a:solidFill>
+                  <a:schemeClr val="tx1"/>
+                </a:solidFill>
+              </a:rPr>
+              <a:t>.</a:t>
+            </a:r>
+          </a:p>
+          <a:p>
+            <a:pPr algn="ctr"/>
+            <a:r>
+              <a:rPr lang="ko-KR" altLang="en-US" dirty="0">
+                <a:solidFill>
+                  <a:schemeClr val="tx1"/>
+                </a:solidFill>
+              </a:rPr>
+              <a:t>같이 </a:t>
+            </a:r>
+            <a:r>
+              <a:rPr lang="ko-KR" altLang="en-US" dirty="0" err="1">
+                <a:solidFill>
+                  <a:schemeClr val="tx1"/>
+                </a:solidFill>
+              </a:rPr>
+              <a:t>노래부르자</a:t>
+            </a:r>
+            <a:r>
+              <a:rPr lang="en-US" altLang="ko-KR" dirty="0">
+                <a:solidFill>
+                  <a:schemeClr val="tx1"/>
+                </a:solidFill>
+              </a:rPr>
+              <a:t>.</a:t>
+            </a:r>
+          </a:p>
+          <a:p>
+            <a:pPr algn="ctr"/>
+            <a:endParaRPr lang="en-US" altLang="ko-KR" dirty="0">
+              <a:solidFill>
+                <a:schemeClr val="tx1"/>
+              </a:solidFill>
+            </a:endParaRPr>
+          </a:p>
+          <a:p>
+            <a:pPr algn="ctr"/>
+            <a:endParaRPr lang="ko-KR" altLang="en-US" dirty="0">
+              <a:solidFill>
+                <a:schemeClr val="tx1"/>
+              </a:solidFill>
+            </a:endParaRPr>
+          </a:p>
+        </p:txBody>
+      </p:sp>
+      <p:sp>
+        <p:nvSpPr>
+          <p:cNvPr id="4" name="TextBox 3">
+            <a:extLst>
+              <a:ext uri="{FF2B5EF4-FFF2-40B4-BE49-F238E27FC236}">
+                <a16:creationId xmlns:a16="http://schemas.microsoft.com/office/drawing/2014/main" id="{6C74CB65-64D9-427C-B2D0-A2413060A102}"/>
+              </a:ext>
+            </a:extLst>
+          </p:cNvPr>
+          <p:cNvSpPr txBox="1"/>
+          <p:nvPr/>
+        </p:nvSpPr>
+        <p:spPr>
+          <a:xfrm>
+            <a:off x="5562311" y="6178861"/>
+            <a:ext cx="1066800" cy="369332"/>
+          </a:xfrm>
+          <a:prstGeom prst="rect">
+            <a:avLst/>
+          </a:prstGeom>
+          <a:noFill/>
+        </p:spPr>
+        <p:txBody>
+          <a:bodyPr wrap="square" rtlCol="0">
+            <a:spAutoFit/>
+          </a:bodyPr>
+          <a:lstStyle/>
+          <a:p>
+            <a:r>
+              <a:rPr lang="en-US" altLang="ko-KR" u="sng" dirty="0">
+                <a:solidFill>
+                  <a:schemeClr val="accent6">
+                    <a:lumMod val="50000"/>
+                  </a:schemeClr>
+                </a:solidFill>
+              </a:rPr>
+              <a:t>JOIN US</a:t>
+            </a:r>
+            <a:endParaRPr lang="ko-KR" altLang="en-US" u="sng" dirty="0">
+              <a:solidFill>
+                <a:schemeClr val="accent6">
+                  <a:lumMod val="50000"/>
+                </a:schemeClr>
+              </a:solidFill>
+            </a:endParaRPr>
+          </a:p>
+        </p:txBody>
+      </p:sp>
+      <p:sp>
+        <p:nvSpPr>
+          <p:cNvPr id="18" name="직사각형 17">
+            <a:extLst>
+              <a:ext uri="{FF2B5EF4-FFF2-40B4-BE49-F238E27FC236}">
+                <a16:creationId xmlns:a16="http://schemas.microsoft.com/office/drawing/2014/main" id="{209F29CB-A1D3-4DDE-8668-71A1B87BC6FB}"/>
+              </a:ext>
+            </a:extLst>
+          </p:cNvPr>
+          <p:cNvSpPr/>
+          <p:nvPr/>
+        </p:nvSpPr>
+        <p:spPr>
+          <a:xfrm>
+            <a:off x="4182047" y="2361458"/>
+            <a:ext cx="3818953" cy="2902998"/>
+          </a:xfrm>
+          <a:prstGeom prst="rect">
+            <a:avLst/>
+          </a:prstGeom>
+          <a:ln>
+            <a:solidFill>
+              <a:schemeClr val="accent6">
+                <a:lumMod val="50000"/>
+              </a:schemeClr>
+            </a:solidFill>
+          </a:ln>
+        </p:spPr>
+        <p:style>
+          <a:lnRef idx="3">
+            <a:schemeClr val="lt1"/>
+          </a:lnRef>
+          <a:fillRef idx="1">
+            <a:schemeClr val="accent6"/>
+          </a:fillRef>
+          <a:effectRef idx="1">
+            <a:schemeClr val="accent6"/>
+          </a:effectRef>
+          <a:fontRef idx="minor">
+            <a:schemeClr val="lt1"/>
+          </a:fontRef>
+        </p:style>
+        <p:txBody>
+          <a:bodyPr rtlCol="0" anchor="ctr"/>
+          <a:lstStyle/>
+          <a:p>
+            <a:pPr algn="ctr"/>
+            <a:r>
+              <a:rPr lang="en-US" altLang="ko-KR" dirty="0"/>
+              <a:t>B</a:t>
+            </a:r>
+            <a:r>
+              <a:rPr lang="ko-KR" altLang="en-US" dirty="0"/>
+              <a:t>동아리</a:t>
+            </a:r>
+          </a:p>
+        </p:txBody>
+      </p:sp>
+      <p:sp>
+        <p:nvSpPr>
+          <p:cNvPr id="19" name="직사각형 18">
+            <a:extLst>
+              <a:ext uri="{FF2B5EF4-FFF2-40B4-BE49-F238E27FC236}">
+                <a16:creationId xmlns:a16="http://schemas.microsoft.com/office/drawing/2014/main" id="{FF202146-6686-4B25-9A76-46231D3FBC3D}"/>
+              </a:ext>
+            </a:extLst>
+          </p:cNvPr>
+          <p:cNvSpPr/>
+          <p:nvPr/>
+        </p:nvSpPr>
+        <p:spPr>
+          <a:xfrm>
+            <a:off x="523872" y="5649149"/>
+            <a:ext cx="3000378" cy="2696316"/>
+          </a:xfrm>
+          <a:prstGeom prst="rect">
+            <a:avLst/>
+          </a:prstGeom>
+          <a:solidFill>
+            <a:schemeClr val="accent6">
+              <a:lumMod val="50000"/>
+              <a:alpha val="50000"/>
+            </a:schemeClr>
+          </a:solidFill>
+          <a:ln>
+            <a:noFill/>
+          </a:ln>
+        </p:spPr>
+        <p:style>
+          <a:lnRef idx="2">
+            <a:schemeClr val="dk1">
+              <a:shade val="50000"/>
+            </a:schemeClr>
+          </a:lnRef>
+          <a:fillRef idx="1">
+            <a:schemeClr val="dk1"/>
+          </a:fillRef>
+          <a:effectRef idx="0">
+            <a:schemeClr val="dk1"/>
+          </a:effectRef>
+          <a:fontRef idx="minor">
+            <a:schemeClr val="lt1"/>
+          </a:fontRef>
+        </p:style>
+        <p:txBody>
+          <a:bodyPr rtlCol="0" anchor="ctr"/>
+          <a:lstStyle/>
+          <a:p>
+            <a:pPr algn="ctr"/>
+            <a:r>
+              <a:rPr lang="en-US" altLang="ko-KR" dirty="0"/>
+              <a:t>D</a:t>
+            </a:r>
+            <a:r>
+              <a:rPr lang="ko-KR" altLang="en-US" dirty="0"/>
+              <a:t>동아리</a:t>
+            </a:r>
+          </a:p>
+        </p:txBody>
+      </p:sp>
+      <p:sp>
+        <p:nvSpPr>
+          <p:cNvPr id="22" name="직사각형 21">
+            <a:extLst>
+              <a:ext uri="{FF2B5EF4-FFF2-40B4-BE49-F238E27FC236}">
+                <a16:creationId xmlns:a16="http://schemas.microsoft.com/office/drawing/2014/main" id="{83BDF873-4B0B-422A-8F89-5177D4160732}"/>
+              </a:ext>
+            </a:extLst>
+          </p:cNvPr>
+          <p:cNvSpPr/>
+          <p:nvPr/>
+        </p:nvSpPr>
+        <p:spPr>
+          <a:xfrm>
+            <a:off x="8667752" y="5649149"/>
+            <a:ext cx="3000378" cy="2696316"/>
+          </a:xfrm>
+          <a:prstGeom prst="rect">
+            <a:avLst/>
+          </a:prstGeom>
+          <a:solidFill>
+            <a:schemeClr val="accent4">
+              <a:lumMod val="50000"/>
+              <a:alpha val="50000"/>
+            </a:schemeClr>
+          </a:solidFill>
+          <a:ln>
+            <a:noFill/>
+          </a:ln>
+        </p:spPr>
+        <p:style>
+          <a:lnRef idx="2">
+            <a:schemeClr val="dk1">
+              <a:shade val="50000"/>
+            </a:schemeClr>
+          </a:lnRef>
+          <a:fillRef idx="1">
+            <a:schemeClr val="dk1"/>
+          </a:fillRef>
+          <a:effectRef idx="0">
+            <a:schemeClr val="dk1"/>
+          </a:effectRef>
+          <a:fontRef idx="minor">
+            <a:schemeClr val="lt1"/>
+          </a:fontRef>
+        </p:style>
+        <p:txBody>
+          <a:bodyPr rtlCol="0" anchor="ctr"/>
+          <a:lstStyle/>
+          <a:p>
+            <a:pPr algn="ctr"/>
+            <a:r>
+              <a:rPr lang="en-US" altLang="ko-KR" dirty="0"/>
+              <a:t>F</a:t>
+            </a:r>
+            <a:r>
+              <a:rPr lang="ko-KR" altLang="en-US" dirty="0"/>
+              <a:t>동아리</a:t>
+            </a:r>
+          </a:p>
+        </p:txBody>
+      </p:sp>
+      <p:cxnSp>
+        <p:nvCxnSpPr>
+          <p:cNvPr id="23" name="직선 연결선 22">
+            <a:extLst>
+              <a:ext uri="{FF2B5EF4-FFF2-40B4-BE49-F238E27FC236}">
+                <a16:creationId xmlns:a16="http://schemas.microsoft.com/office/drawing/2014/main" id="{9C687BC7-2375-410E-926B-E953855CC473}"/>
+              </a:ext>
+            </a:extLst>
+          </p:cNvPr>
+          <p:cNvCxnSpPr>
+            <a:cxnSpLocks/>
+          </p:cNvCxnSpPr>
+          <p:nvPr/>
+        </p:nvCxnSpPr>
+        <p:spPr>
+          <a:xfrm>
+            <a:off x="0" y="825622"/>
+            <a:ext cx="12192000" cy="0"/>
+          </a:xfrm>
+          <a:prstGeom prst="line">
+            <a:avLst/>
+          </a:prstGeom>
+          <a:ln w="19050">
+            <a:solidFill>
+              <a:srgbClr val="8B8A86"/>
+            </a:solidFill>
+          </a:ln>
+        </p:spPr>
+        <p:style>
+          <a:lnRef idx="1">
+            <a:schemeClr val="accent1"/>
+          </a:lnRef>
+          <a:fillRef idx="0">
+            <a:schemeClr val="accent1"/>
+          </a:fillRef>
+          <a:effectRef idx="0">
+            <a:schemeClr val="accent1"/>
+          </a:effectRef>
+          <a:fontRef idx="minor">
+            <a:schemeClr val="tx1"/>
+          </a:fontRef>
+        </p:style>
+      </p:cxnSp>
+    </p:spTree>
+    <p:extLst>
+      <p:ext uri="{BB962C8B-B14F-4D97-AF65-F5344CB8AC3E}">
+        <p14:creationId xmlns:p14="http://schemas.microsoft.com/office/powerpoint/2010/main" val="3682748122"/>
+      </p:ext>
+    </p:extLst>
+  </p:cSld>
+  <p:clrMapOvr>
+    <a:masterClrMapping/>
+  </p:clrMapOvr>
+</p:sld>
+</file>
+
+<file path=ppt/slides/slide7.xml><?xml version="1.0" encoding="utf-8"?>
+<p:sld xmlns:a="http://schemas.openxmlformats.org/drawingml/2006/main" xmlns:r="http://schemas.openxmlformats.org/officeDocument/2006/relationships" xmlns:p="http://schemas.openxmlformats.org/presentationml/2006/main">
+  <p:cSld>
+    <p:spTree>
+      <p:nvGrpSpPr>
+        <p:cNvPr id="1" name=""/>
+        <p:cNvGrpSpPr/>
+        <p:nvPr/>
+      </p:nvGrpSpPr>
+      <p:grpSpPr>
+        <a:xfrm>
+          <a:off x="0" y="0"/>
+          <a:ext cx="0" cy="0"/>
+          <a:chOff x="0" y="0"/>
+          <a:chExt cx="0" cy="0"/>
+        </a:xfrm>
+      </p:grpSpPr>
+      <p:sp>
+        <p:nvSpPr>
+          <p:cNvPr id="7" name="TextBox 6">
+            <a:extLst>
+              <a:ext uri="{FF2B5EF4-FFF2-40B4-BE49-F238E27FC236}">
+                <a16:creationId xmlns:a16="http://schemas.microsoft.com/office/drawing/2014/main" id="{9DAB59B5-5CB9-4E0A-9118-4E8C123D32AD}"/>
+              </a:ext>
+            </a:extLst>
+          </p:cNvPr>
+          <p:cNvSpPr txBox="1"/>
+          <p:nvPr/>
+        </p:nvSpPr>
+        <p:spPr>
+          <a:xfrm>
+            <a:off x="11144251" y="177547"/>
+            <a:ext cx="1047750" cy="553998"/>
+          </a:xfrm>
+          <a:prstGeom prst="rect">
+            <a:avLst/>
+          </a:prstGeom>
+          <a:noFill/>
+        </p:spPr>
+        <p:txBody>
+          <a:bodyPr wrap="square" rtlCol="0">
+            <a:spAutoFit/>
+          </a:bodyPr>
+          <a:lstStyle/>
+          <a:p>
+            <a:r>
+              <a:rPr lang="ko-KR" altLang="en-US" sz="1500" dirty="0">
+                <a:latin typeface="아임크리수진" panose="00000500000000000000" pitchFamily="2" charset="-127"/>
+                <a:ea typeface="아임크리수진" panose="00000500000000000000" pitchFamily="2" charset="-127"/>
+              </a:rPr>
+              <a:t>로그인</a:t>
+            </a:r>
+            <a:r>
+              <a:rPr lang="en-US" altLang="ko-KR" sz="1500" dirty="0">
+                <a:latin typeface="아임크리수진" panose="00000500000000000000" pitchFamily="2" charset="-127"/>
+                <a:ea typeface="아임크리수진" panose="00000500000000000000" pitchFamily="2" charset="-127"/>
+              </a:rPr>
+              <a:t>/</a:t>
+            </a:r>
+          </a:p>
+          <a:p>
+            <a:r>
+              <a:rPr lang="ko-KR" altLang="en-US" sz="1500" dirty="0">
+                <a:latin typeface="아임크리수진" panose="00000500000000000000" pitchFamily="2" charset="-127"/>
+                <a:ea typeface="아임크리수진" panose="00000500000000000000" pitchFamily="2" charset="-127"/>
+              </a:rPr>
+              <a:t>회원가입</a:t>
+            </a:r>
+          </a:p>
+        </p:txBody>
+      </p:sp>
+      <p:sp>
+        <p:nvSpPr>
+          <p:cNvPr id="20" name="TextBox 19">
+            <a:extLst>
+              <a:ext uri="{FF2B5EF4-FFF2-40B4-BE49-F238E27FC236}">
+                <a16:creationId xmlns:a16="http://schemas.microsoft.com/office/drawing/2014/main" id="{14221B33-91FE-40D2-9616-AAF5423D933B}"/>
+              </a:ext>
+            </a:extLst>
+          </p:cNvPr>
+          <p:cNvSpPr txBox="1"/>
+          <p:nvPr/>
+        </p:nvSpPr>
+        <p:spPr>
+          <a:xfrm>
+            <a:off x="71021" y="177547"/>
+            <a:ext cx="1576804" cy="523220"/>
+          </a:xfrm>
+          <a:prstGeom prst="rect">
+            <a:avLst/>
+          </a:prstGeom>
+          <a:noFill/>
+        </p:spPr>
+        <p:txBody>
+          <a:bodyPr wrap="square" rtlCol="0">
+            <a:spAutoFit/>
+          </a:bodyPr>
+          <a:lstStyle/>
+          <a:p>
+            <a:r>
+              <a:rPr lang="ko-KR" altLang="en-US" sz="2800" dirty="0">
+                <a:latin typeface="아임크리수진" panose="00000500000000000000" pitchFamily="2" charset="-127"/>
+                <a:ea typeface="아임크리수진" panose="00000500000000000000" pitchFamily="2" charset="-127"/>
+              </a:rPr>
+              <a:t>우 학 동</a:t>
+            </a:r>
+          </a:p>
+        </p:txBody>
+      </p:sp>
+      <p:cxnSp>
+        <p:nvCxnSpPr>
+          <p:cNvPr id="15" name="직선 연결선 14">
+            <a:extLst>
+              <a:ext uri="{FF2B5EF4-FFF2-40B4-BE49-F238E27FC236}">
+                <a16:creationId xmlns:a16="http://schemas.microsoft.com/office/drawing/2014/main" id="{0888132D-A4DD-4F7E-A3E1-9092BCC3927B}"/>
+              </a:ext>
+            </a:extLst>
+          </p:cNvPr>
+          <p:cNvCxnSpPr>
+            <a:cxnSpLocks/>
+          </p:cNvCxnSpPr>
+          <p:nvPr/>
+        </p:nvCxnSpPr>
+        <p:spPr>
+          <a:xfrm>
+            <a:off x="0" y="825623"/>
+            <a:ext cx="12192000" cy="0"/>
+          </a:xfrm>
+          <a:prstGeom prst="line">
+            <a:avLst/>
+          </a:prstGeom>
+          <a:ln w="19050">
+            <a:solidFill>
+              <a:srgbClr val="8B8A86"/>
+            </a:solidFill>
+          </a:ln>
+        </p:spPr>
+        <p:style>
+          <a:lnRef idx="1">
+            <a:schemeClr val="accent1"/>
+          </a:lnRef>
+          <a:fillRef idx="0">
+            <a:schemeClr val="accent1"/>
+          </a:fillRef>
+          <a:effectRef idx="0">
+            <a:schemeClr val="accent1"/>
+          </a:effectRef>
+          <a:fontRef idx="minor">
+            <a:schemeClr val="tx1"/>
+          </a:fontRef>
+        </p:style>
+      </p:cxnSp>
+    </p:spTree>
+    <p:extLst>
+      <p:ext uri="{BB962C8B-B14F-4D97-AF65-F5344CB8AC3E}">
+        <p14:creationId xmlns:p14="http://schemas.microsoft.com/office/powerpoint/2010/main" val="1248458427"/>
+      </p:ext>
+    </p:extLst>
+  </p:cSld>
+  <p:clrMapOvr>
+    <a:masterClrMapping/>
+  </p:clrMapOvr>
+</p:sld>
+</file>
+
+<file path=ppt/slides/slide8.xml><?xml version="1.0" encoding="utf-8"?>
 <p:sld xmlns:a="http://schemas.openxmlformats.org/drawingml/2006/main" xmlns:r="http://schemas.openxmlformats.org/officeDocument/2006/relationships" xmlns:p="http://schemas.openxmlformats.org/presentationml/2006/main">
   <p:cSld>
     <p:spTree>

</xml_diff>